<commit_message>
modified:   Images/dash1.psd 	modified:   Images/dash11.jpg 	modified:   Proposal/MP1 Asher.pptx 	modified:   Style.css
</commit_message>
<xml_diff>
--- a/Proposal/MP1 Asher.pptx
+++ b/Proposal/MP1 Asher.pptx
@@ -1042,13 +1042,6 @@
           </ac:picMkLst>
         </pc:picChg>
       </pc:sldChg>
-      <pc:sldChg chg="del">
-        <pc:chgData name="Asher A. Federico" userId="cd7a243a-c1f3-4c9b-91c6-981eb251bbbc" providerId="ADAL" clId="{DDC23D58-17AC-4D35-A60B-909B34B5002F}" dt="2023-05-14T14:09:43.007" v="708" actId="47"/>
-        <pc:sldMkLst>
-          <pc:docMk/>
-          <pc:sldMk cId="2573834672" sldId="266"/>
-        </pc:sldMkLst>
-      </pc:sldChg>
       <pc:sldChg chg="addSp delSp modSp add mod setBg addAnim delAnim delDesignElem">
         <pc:chgData name="Asher A. Federico" userId="cd7a243a-c1f3-4c9b-91c6-981eb251bbbc" providerId="ADAL" clId="{DDC23D58-17AC-4D35-A60B-909B34B5002F}" dt="2023-05-14T14:59:30.518" v="991" actId="26606"/>
         <pc:sldMkLst>
@@ -1525,7 +1518,7 @@
             <a:fld id="{1D8BD707-D9CF-40AE-B4C6-C98DA3205C09}" type="datetimeFigureOut">
               <a:rPr lang="en-US" smtClean="0"/>
               <a:pPr/>
-              <a:t>5/14/2023</a:t>
+              <a:t>6/5/2023</a:t>
             </a:fld>
             <a:endParaRPr lang="en-US"/>
           </a:p>
@@ -1690,7 +1683,7 @@
             <a:fld id="{1D8BD707-D9CF-40AE-B4C6-C98DA3205C09}" type="datetimeFigureOut">
               <a:rPr lang="en-US" smtClean="0"/>
               <a:pPr/>
-              <a:t>5/14/2023</a:t>
+              <a:t>6/5/2023</a:t>
             </a:fld>
             <a:endParaRPr lang="en-US"/>
           </a:p>
@@ -1865,7 +1858,7 @@
             <a:fld id="{1D8BD707-D9CF-40AE-B4C6-C98DA3205C09}" type="datetimeFigureOut">
               <a:rPr lang="en-US" smtClean="0"/>
               <a:pPr/>
-              <a:t>5/14/2023</a:t>
+              <a:t>6/5/2023</a:t>
             </a:fld>
             <a:endParaRPr lang="en-US"/>
           </a:p>
@@ -2030,7 +2023,7 @@
             <a:fld id="{1D8BD707-D9CF-40AE-B4C6-C98DA3205C09}" type="datetimeFigureOut">
               <a:rPr lang="en-US" smtClean="0"/>
               <a:pPr/>
-              <a:t>5/14/2023</a:t>
+              <a:t>6/5/2023</a:t>
             </a:fld>
             <a:endParaRPr lang="en-US"/>
           </a:p>
@@ -2272,7 +2265,7 @@
             <a:fld id="{1D8BD707-D9CF-40AE-B4C6-C98DA3205C09}" type="datetimeFigureOut">
               <a:rPr lang="en-US" smtClean="0"/>
               <a:pPr/>
-              <a:t>5/14/2023</a:t>
+              <a:t>6/5/2023</a:t>
             </a:fld>
             <a:endParaRPr lang="en-US"/>
           </a:p>
@@ -2554,7 +2547,7 @@
             <a:fld id="{1D8BD707-D9CF-40AE-B4C6-C98DA3205C09}" type="datetimeFigureOut">
               <a:rPr lang="en-US" smtClean="0"/>
               <a:pPr/>
-              <a:t>5/14/2023</a:t>
+              <a:t>6/5/2023</a:t>
             </a:fld>
             <a:endParaRPr lang="en-US"/>
           </a:p>
@@ -2970,7 +2963,7 @@
             <a:fld id="{1D8BD707-D9CF-40AE-B4C6-C98DA3205C09}" type="datetimeFigureOut">
               <a:rPr lang="en-US" smtClean="0"/>
               <a:pPr/>
-              <a:t>5/14/2023</a:t>
+              <a:t>6/5/2023</a:t>
             </a:fld>
             <a:endParaRPr lang="en-US"/>
           </a:p>
@@ -3084,7 +3077,7 @@
             <a:fld id="{1D8BD707-D9CF-40AE-B4C6-C98DA3205C09}" type="datetimeFigureOut">
               <a:rPr lang="en-US" smtClean="0"/>
               <a:pPr/>
-              <a:t>5/14/2023</a:t>
+              <a:t>6/5/2023</a:t>
             </a:fld>
             <a:endParaRPr lang="en-US"/>
           </a:p>
@@ -3176,7 +3169,7 @@
             <a:fld id="{1D8BD707-D9CF-40AE-B4C6-C98DA3205C09}" type="datetimeFigureOut">
               <a:rPr lang="en-US" smtClean="0"/>
               <a:pPr/>
-              <a:t>5/14/2023</a:t>
+              <a:t>6/5/2023</a:t>
             </a:fld>
             <a:endParaRPr lang="en-US"/>
           </a:p>
@@ -3448,7 +3441,7 @@
             <a:fld id="{1D8BD707-D9CF-40AE-B4C6-C98DA3205C09}" type="datetimeFigureOut">
               <a:rPr lang="en-US" smtClean="0"/>
               <a:pPr/>
-              <a:t>5/14/2023</a:t>
+              <a:t>6/5/2023</a:t>
             </a:fld>
             <a:endParaRPr lang="en-US"/>
           </a:p>
@@ -3697,7 +3690,7 @@
             <a:fld id="{1D8BD707-D9CF-40AE-B4C6-C98DA3205C09}" type="datetimeFigureOut">
               <a:rPr lang="en-US" smtClean="0"/>
               <a:pPr/>
-              <a:t>5/14/2023</a:t>
+              <a:t>6/5/2023</a:t>
             </a:fld>
             <a:endParaRPr lang="en-US"/>
           </a:p>
@@ -3905,7 +3898,7 @@
             <a:fld id="{1D8BD707-D9CF-40AE-B4C6-C98DA3205C09}" type="datetimeFigureOut">
               <a:rPr lang="en-US" smtClean="0"/>
               <a:pPr/>
-              <a:t>5/14/2023</a:t>
+              <a:t>6/5/2023</a:t>
             </a:fld>
             <a:endParaRPr lang="en-US"/>
           </a:p>
@@ -6132,7 +6125,7 @@
             <a:pPr algn="ctr"/>
             <a:r>
               <a:rPr lang="en-US" sz="2500" dirty="0"/>
-              <a:t>Order Now</a:t>
+              <a:t>Gallery</a:t>
             </a:r>
           </a:p>
         </p:txBody>
@@ -6200,8 +6193,8 @@
         </p:nvSpPr>
         <p:spPr>
           <a:xfrm>
-            <a:off x="12634768" y="6347075"/>
-            <a:ext cx="1519727" cy="343640"/>
+            <a:off x="12634768" y="6347074"/>
+            <a:ext cx="1519727" cy="653733"/>
           </a:xfrm>
           <a:prstGeom prst="roundRect">
             <a:avLst/>
@@ -6230,7 +6223,7 @@
             <a:pPr algn="ctr"/>
             <a:r>
               <a:rPr lang="en-US" sz="2500" dirty="0"/>
-              <a:t>Contact</a:t>
+              <a:t>About Us</a:t>
             </a:r>
           </a:p>
         </p:txBody>
@@ -6249,8 +6242,8 @@
         </p:nvSpPr>
         <p:spPr>
           <a:xfrm>
-            <a:off x="12555995" y="7199029"/>
-            <a:ext cx="1519727" cy="343640"/>
+            <a:off x="12624829" y="7464209"/>
+            <a:ext cx="1519727" cy="840071"/>
           </a:xfrm>
           <a:prstGeom prst="roundRect">
             <a:avLst/>
@@ -6279,17 +6272,17 @@
             <a:pPr algn="ctr"/>
             <a:r>
               <a:rPr lang="en-US" sz="2500" dirty="0"/>
-              <a:t>Gallery</a:t>
+              <a:t>Get in touch</a:t>
             </a:r>
           </a:p>
         </p:txBody>
       </p:sp>
       <p:sp>
         <p:nvSpPr>
-          <p:cNvPr id="50" name="Rectangle: Rounded Corners 49">
+          <p:cNvPr id="51" name="Rectangle: Rounded Corners 50">
             <a:extLst>
               <a:ext uri="{FF2B5EF4-FFF2-40B4-BE49-F238E27FC236}">
-                <a16:creationId xmlns:a16="http://schemas.microsoft.com/office/drawing/2014/main" id="{2B171CA6-0355-BD37-FFA8-F3A60D3D26F6}"/>
+                <a16:creationId xmlns:a16="http://schemas.microsoft.com/office/drawing/2014/main" id="{E0E1D2A0-A07B-4AE3-233A-A17E075DAA5C}"/>
               </a:ext>
             </a:extLst>
           </p:cNvPr>
@@ -6298,8 +6291,8 @@
         </p:nvSpPr>
         <p:spPr>
           <a:xfrm>
-            <a:off x="12313446" y="8173250"/>
-            <a:ext cx="1934292" cy="343640"/>
+            <a:off x="9734686" y="6309468"/>
+            <a:ext cx="1519727" cy="343640"/>
           </a:xfrm>
           <a:prstGeom prst="roundRect">
             <a:avLst/>
@@ -6328,17 +6321,17 @@
             <a:pPr algn="ctr"/>
             <a:r>
               <a:rPr lang="en-US" sz="2500" dirty="0"/>
-              <a:t>Testimonials</a:t>
+              <a:t>Image </a:t>
             </a:r>
           </a:p>
         </p:txBody>
       </p:sp>
       <p:sp>
         <p:nvSpPr>
-          <p:cNvPr id="51" name="Rectangle: Rounded Corners 50">
+          <p:cNvPr id="52" name="Rectangle: Rounded Corners 51">
             <a:extLst>
               <a:ext uri="{FF2B5EF4-FFF2-40B4-BE49-F238E27FC236}">
-                <a16:creationId xmlns:a16="http://schemas.microsoft.com/office/drawing/2014/main" id="{E0E1D2A0-A07B-4AE3-233A-A17E075DAA5C}"/>
+                <a16:creationId xmlns:a16="http://schemas.microsoft.com/office/drawing/2014/main" id="{2020305B-4965-243D-1E5B-4067845920AE}"/>
               </a:ext>
             </a:extLst>
           </p:cNvPr>
@@ -6347,7 +6340,7 @@
         </p:nvSpPr>
         <p:spPr>
           <a:xfrm>
-            <a:off x="9734686" y="6309468"/>
+            <a:off x="7012535" y="5963180"/>
             <a:ext cx="1519727" cy="343640"/>
           </a:xfrm>
           <a:prstGeom prst="roundRect">
@@ -6377,17 +6370,17 @@
             <a:pPr algn="ctr"/>
             <a:r>
               <a:rPr lang="en-US" sz="2500" dirty="0"/>
-              <a:t>Menu</a:t>
+              <a:t>Pork</a:t>
             </a:r>
           </a:p>
         </p:txBody>
       </p:sp>
       <p:sp>
         <p:nvSpPr>
-          <p:cNvPr id="52" name="Rectangle: Rounded Corners 51">
+          <p:cNvPr id="53" name="Rectangle: Rounded Corners 52">
             <a:extLst>
               <a:ext uri="{FF2B5EF4-FFF2-40B4-BE49-F238E27FC236}">
-                <a16:creationId xmlns:a16="http://schemas.microsoft.com/office/drawing/2014/main" id="{2020305B-4965-243D-1E5B-4067845920AE}"/>
+                <a16:creationId xmlns:a16="http://schemas.microsoft.com/office/drawing/2014/main" id="{F7F71B56-2CF2-9D6F-8A03-70FC734E31A8}"/>
               </a:ext>
             </a:extLst>
           </p:cNvPr>
@@ -6396,7 +6389,7 @@
         </p:nvSpPr>
         <p:spPr>
           <a:xfrm>
-            <a:off x="7051121" y="6292921"/>
+            <a:off x="6972574" y="7989206"/>
             <a:ext cx="1519727" cy="343640"/>
           </a:xfrm>
           <a:prstGeom prst="roundRect">
@@ -6426,17 +6419,17 @@
             <a:pPr algn="ctr"/>
             <a:r>
               <a:rPr lang="en-US" sz="2500" dirty="0"/>
-              <a:t>Pork</a:t>
+              <a:t>Beef</a:t>
             </a:r>
           </a:p>
         </p:txBody>
       </p:sp>
       <p:sp>
         <p:nvSpPr>
-          <p:cNvPr id="53" name="Rectangle: Rounded Corners 52">
+          <p:cNvPr id="54" name="Rectangle: Rounded Corners 53">
             <a:extLst>
               <a:ext uri="{FF2B5EF4-FFF2-40B4-BE49-F238E27FC236}">
-                <a16:creationId xmlns:a16="http://schemas.microsoft.com/office/drawing/2014/main" id="{F7F71B56-2CF2-9D6F-8A03-70FC734E31A8}"/>
+                <a16:creationId xmlns:a16="http://schemas.microsoft.com/office/drawing/2014/main" id="{7578D4AF-6561-BEE0-E7DE-A3E6041C5A48}"/>
               </a:ext>
             </a:extLst>
           </p:cNvPr>
@@ -6445,7 +6438,7 @@
         </p:nvSpPr>
         <p:spPr>
           <a:xfrm>
-            <a:off x="7051120" y="7099036"/>
+            <a:off x="6948416" y="8735786"/>
             <a:ext cx="1519727" cy="343640"/>
           </a:xfrm>
           <a:prstGeom prst="roundRect">
@@ -6475,154 +6468,7 @@
             <a:pPr algn="ctr"/>
             <a:r>
               <a:rPr lang="en-US" sz="2500" dirty="0"/>
-              <a:t>Beef</a:t>
-            </a:r>
-          </a:p>
-        </p:txBody>
-      </p:sp>
-      <p:sp>
-        <p:nvSpPr>
-          <p:cNvPr id="54" name="Rectangle: Rounded Corners 53">
-            <a:extLst>
-              <a:ext uri="{FF2B5EF4-FFF2-40B4-BE49-F238E27FC236}">
-                <a16:creationId xmlns:a16="http://schemas.microsoft.com/office/drawing/2014/main" id="{7578D4AF-6561-BEE0-E7DE-A3E6041C5A48}"/>
-              </a:ext>
-            </a:extLst>
-          </p:cNvPr>
-          <p:cNvSpPr/>
-          <p:nvPr/>
-        </p:nvSpPr>
-        <p:spPr>
-          <a:xfrm>
-            <a:off x="7026962" y="7845616"/>
-            <a:ext cx="1519727" cy="343640"/>
-          </a:xfrm>
-          <a:prstGeom prst="roundRect">
-            <a:avLst/>
-          </a:prstGeom>
-        </p:spPr>
-        <p:style>
-          <a:lnRef idx="2">
-            <a:schemeClr val="accent1">
-              <a:shade val="50000"/>
-            </a:schemeClr>
-          </a:lnRef>
-          <a:fillRef idx="1">
-            <a:schemeClr val="accent1"/>
-          </a:fillRef>
-          <a:effectRef idx="0">
-            <a:schemeClr val="accent1"/>
-          </a:effectRef>
-          <a:fontRef idx="minor">
-            <a:schemeClr val="lt1"/>
-          </a:fontRef>
-        </p:style>
-        <p:txBody>
-          <a:bodyPr rtlCol="0" anchor="ctr"/>
-          <a:lstStyle/>
-          <a:p>
-            <a:pPr algn="ctr"/>
-            <a:r>
-              <a:rPr lang="en-US" sz="2500" dirty="0"/>
               <a:t>Sides</a:t>
-            </a:r>
-          </a:p>
-        </p:txBody>
-      </p:sp>
-      <p:sp>
-        <p:nvSpPr>
-          <p:cNvPr id="57" name="Rectangle: Rounded Corners 56">
-            <a:extLst>
-              <a:ext uri="{FF2B5EF4-FFF2-40B4-BE49-F238E27FC236}">
-                <a16:creationId xmlns:a16="http://schemas.microsoft.com/office/drawing/2014/main" id="{343C141B-A114-69AC-C210-5B580869B0F4}"/>
-              </a:ext>
-            </a:extLst>
-          </p:cNvPr>
-          <p:cNvSpPr/>
-          <p:nvPr/>
-        </p:nvSpPr>
-        <p:spPr>
-          <a:xfrm>
-            <a:off x="12120567" y="9025204"/>
-            <a:ext cx="2391306" cy="343640"/>
-          </a:xfrm>
-          <a:prstGeom prst="roundRect">
-            <a:avLst/>
-          </a:prstGeom>
-        </p:spPr>
-        <p:style>
-          <a:lnRef idx="2">
-            <a:schemeClr val="accent1">
-              <a:shade val="50000"/>
-            </a:schemeClr>
-          </a:lnRef>
-          <a:fillRef idx="1">
-            <a:schemeClr val="accent1"/>
-          </a:fillRef>
-          <a:effectRef idx="0">
-            <a:schemeClr val="accent1"/>
-          </a:effectRef>
-          <a:fontRef idx="minor">
-            <a:schemeClr val="lt1"/>
-          </a:fontRef>
-        </p:style>
-        <p:txBody>
-          <a:bodyPr rtlCol="0" anchor="ctr"/>
-          <a:lstStyle/>
-          <a:p>
-            <a:pPr algn="ctr"/>
-            <a:r>
-              <a:rPr lang="en-US" sz="2500" dirty="0"/>
-              <a:t>Announcement</a:t>
-            </a:r>
-          </a:p>
-        </p:txBody>
-      </p:sp>
-      <p:sp>
-        <p:nvSpPr>
-          <p:cNvPr id="58" name="Rectangle: Rounded Corners 57">
-            <a:extLst>
-              <a:ext uri="{FF2B5EF4-FFF2-40B4-BE49-F238E27FC236}">
-                <a16:creationId xmlns:a16="http://schemas.microsoft.com/office/drawing/2014/main" id="{E6519461-8ECD-9C77-90C7-F49BB5325874}"/>
-              </a:ext>
-            </a:extLst>
-          </p:cNvPr>
-          <p:cNvSpPr/>
-          <p:nvPr/>
-        </p:nvSpPr>
-        <p:spPr>
-          <a:xfrm>
-            <a:off x="9741312" y="7249446"/>
-            <a:ext cx="1519727" cy="767990"/>
-          </a:xfrm>
-          <a:prstGeom prst="roundRect">
-            <a:avLst/>
-          </a:prstGeom>
-        </p:spPr>
-        <p:style>
-          <a:lnRef idx="2">
-            <a:schemeClr val="accent1">
-              <a:shade val="50000"/>
-            </a:schemeClr>
-          </a:lnRef>
-          <a:fillRef idx="1">
-            <a:schemeClr val="accent1"/>
-          </a:fillRef>
-          <a:effectRef idx="0">
-            <a:schemeClr val="accent1"/>
-          </a:effectRef>
-          <a:fontRef idx="minor">
-            <a:schemeClr val="lt1"/>
-          </a:fontRef>
-        </p:style>
-        <p:txBody>
-          <a:bodyPr rtlCol="0" anchor="ctr"/>
-          <a:lstStyle/>
-          <a:p>
-            <a:pPr algn="ctr"/>
-            <a:r>
-              <a:rPr lang="en-US" sz="2500" dirty="0"/>
-              <a:t>Pick up/ Deliver</a:t>
             </a:r>
           </a:p>
         </p:txBody>
@@ -6833,13 +6679,14 @@
           </p:cNvPr>
           <p:cNvCxnSpPr>
             <a:cxnSpLocks/>
+            <a:endCxn id="52" idx="0"/>
           </p:cNvCxnSpPr>
           <p:nvPr/>
         </p:nvCxnSpPr>
         <p:spPr>
-          <a:xfrm>
-            <a:off x="7772400" y="5541310"/>
-            <a:ext cx="0" cy="768158"/>
+          <a:xfrm flipH="1">
+            <a:off x="7772399" y="5541310"/>
+            <a:ext cx="1" cy="421870"/>
           </a:xfrm>
           <a:prstGeom prst="straightConnector1">
             <a:avLst/>
@@ -6961,49 +6808,8 @@
         </p:nvCxnSpPr>
         <p:spPr>
           <a:xfrm flipH="1">
-            <a:off x="7772399" y="6627132"/>
+            <a:off x="7732437" y="7526731"/>
             <a:ext cx="1" cy="462475"/>
-          </a:xfrm>
-          <a:prstGeom prst="straightConnector1">
-            <a:avLst/>
-          </a:prstGeom>
-          <a:ln>
-            <a:tailEnd type="triangle"/>
-          </a:ln>
-        </p:spPr>
-        <p:style>
-          <a:lnRef idx="1">
-            <a:schemeClr val="accent1"/>
-          </a:lnRef>
-          <a:fillRef idx="0">
-            <a:schemeClr val="accent1"/>
-          </a:fillRef>
-          <a:effectRef idx="0">
-            <a:schemeClr val="accent1"/>
-          </a:effectRef>
-          <a:fontRef idx="minor">
-            <a:schemeClr val="tx1"/>
-          </a:fontRef>
-        </p:style>
-      </p:cxnSp>
-      <p:cxnSp>
-        <p:nvCxnSpPr>
-          <p:cNvPr id="79" name="Straight Arrow Connector 78">
-            <a:extLst>
-              <a:ext uri="{FF2B5EF4-FFF2-40B4-BE49-F238E27FC236}">
-                <a16:creationId xmlns:a16="http://schemas.microsoft.com/office/drawing/2014/main" id="{99070B85-4DF7-DE9B-7D21-1AD4AA0FB75B}"/>
-              </a:ext>
-            </a:extLst>
-          </p:cNvPr>
-          <p:cNvCxnSpPr>
-            <a:cxnSpLocks/>
-          </p:cNvCxnSpPr>
-          <p:nvPr/>
-        </p:nvCxnSpPr>
-        <p:spPr>
-          <a:xfrm>
-            <a:off x="10462591" y="6659989"/>
-            <a:ext cx="0" cy="610867"/>
           </a:xfrm>
           <a:prstGeom prst="straightConnector1">
             <a:avLst/>
@@ -7036,45 +6842,6 @@
               </a:ext>
             </a:extLst>
           </p:cNvPr>
-          <p:cNvCxnSpPr/>
-          <p:nvPr/>
-        </p:nvCxnSpPr>
-        <p:spPr>
-          <a:xfrm>
-            <a:off x="13258800" y="6690715"/>
-            <a:ext cx="0" cy="508314"/>
-          </a:xfrm>
-          <a:prstGeom prst="straightConnector1">
-            <a:avLst/>
-          </a:prstGeom>
-          <a:ln>
-            <a:tailEnd type="triangle"/>
-          </a:ln>
-        </p:spPr>
-        <p:style>
-          <a:lnRef idx="1">
-            <a:schemeClr val="accent1"/>
-          </a:lnRef>
-          <a:fillRef idx="0">
-            <a:schemeClr val="accent1"/>
-          </a:fillRef>
-          <a:effectRef idx="0">
-            <a:schemeClr val="accent1"/>
-          </a:effectRef>
-          <a:fontRef idx="minor">
-            <a:schemeClr val="tx1"/>
-          </a:fontRef>
-        </p:style>
-      </p:cxnSp>
-      <p:cxnSp>
-        <p:nvCxnSpPr>
-          <p:cNvPr id="107" name="Straight Arrow Connector 106">
-            <a:extLst>
-              <a:ext uri="{FF2B5EF4-FFF2-40B4-BE49-F238E27FC236}">
-                <a16:creationId xmlns:a16="http://schemas.microsoft.com/office/drawing/2014/main" id="{BA15EB2C-5BC8-7992-3774-BC45D93AEE18}"/>
-              </a:ext>
-            </a:extLst>
-          </p:cNvPr>
           <p:cNvCxnSpPr>
             <a:cxnSpLocks/>
           </p:cNvCxnSpPr>
@@ -7082,49 +6849,8 @@
         </p:nvCxnSpPr>
         <p:spPr>
           <a:xfrm>
-            <a:off x="13258800" y="7509122"/>
-            <a:ext cx="0" cy="664128"/>
-          </a:xfrm>
-          <a:prstGeom prst="straightConnector1">
-            <a:avLst/>
-          </a:prstGeom>
-          <a:ln>
-            <a:tailEnd type="triangle"/>
-          </a:ln>
-        </p:spPr>
-        <p:style>
-          <a:lnRef idx="1">
-            <a:schemeClr val="accent1"/>
-          </a:lnRef>
-          <a:fillRef idx="0">
-            <a:schemeClr val="accent1"/>
-          </a:fillRef>
-          <a:effectRef idx="0">
-            <a:schemeClr val="accent1"/>
-          </a:effectRef>
-          <a:fontRef idx="minor">
-            <a:schemeClr val="tx1"/>
-          </a:fontRef>
-        </p:style>
-      </p:cxnSp>
-      <p:cxnSp>
-        <p:nvCxnSpPr>
-          <p:cNvPr id="109" name="Straight Arrow Connector 108">
-            <a:extLst>
-              <a:ext uri="{FF2B5EF4-FFF2-40B4-BE49-F238E27FC236}">
-                <a16:creationId xmlns:a16="http://schemas.microsoft.com/office/drawing/2014/main" id="{C4295F96-9148-821F-87C6-7255B0C78145}"/>
-              </a:ext>
-            </a:extLst>
-          </p:cNvPr>
-          <p:cNvCxnSpPr>
-            <a:cxnSpLocks/>
-          </p:cNvCxnSpPr>
-          <p:nvPr/>
-        </p:nvCxnSpPr>
-        <p:spPr>
-          <a:xfrm>
-            <a:off x="13258800" y="8516890"/>
-            <a:ext cx="0" cy="508314"/>
+            <a:off x="13258800" y="6690715"/>
+            <a:ext cx="0" cy="751961"/>
           </a:xfrm>
           <a:prstGeom prst="straightConnector1">
             <a:avLst/>
@@ -7203,7 +6929,7 @@
         </p:nvSpPr>
         <p:spPr>
           <a:xfrm>
-            <a:off x="7012535" y="8651731"/>
+            <a:off x="6933989" y="9541901"/>
             <a:ext cx="1598064" cy="343640"/>
           </a:xfrm>
           <a:prstGeom prst="roundRect">
@@ -7252,7 +6978,7 @@
         </p:nvCxnSpPr>
         <p:spPr>
           <a:xfrm>
-            <a:off x="7772400" y="7429500"/>
+            <a:off x="7693854" y="8319670"/>
             <a:ext cx="0" cy="402940"/>
           </a:xfrm>
           <a:prstGeom prst="straightConnector1">
@@ -7291,8 +7017,368 @@
         </p:nvCxnSpPr>
         <p:spPr>
           <a:xfrm>
-            <a:off x="7772400" y="8191500"/>
+            <a:off x="7693854" y="9081670"/>
             <a:ext cx="0" cy="462475"/>
+          </a:xfrm>
+          <a:prstGeom prst="straightConnector1">
+            <a:avLst/>
+          </a:prstGeom>
+          <a:ln>
+            <a:tailEnd type="triangle"/>
+          </a:ln>
+        </p:spPr>
+        <p:style>
+          <a:lnRef idx="1">
+            <a:schemeClr val="accent1"/>
+          </a:lnRef>
+          <a:fillRef idx="0">
+            <a:schemeClr val="accent1"/>
+          </a:fillRef>
+          <a:effectRef idx="0">
+            <a:schemeClr val="accent1"/>
+          </a:effectRef>
+          <a:fontRef idx="minor">
+            <a:schemeClr val="tx1"/>
+          </a:fontRef>
+        </p:style>
+      </p:cxnSp>
+      <p:sp>
+        <p:nvSpPr>
+          <p:cNvPr id="3" name="Rectangle: Rounded Corners 2">
+            <a:extLst>
+              <a:ext uri="{FF2B5EF4-FFF2-40B4-BE49-F238E27FC236}">
+                <a16:creationId xmlns:a16="http://schemas.microsoft.com/office/drawing/2014/main" id="{C762F320-FA41-2D62-FB27-DF91BFD9A517}"/>
+              </a:ext>
+            </a:extLst>
+          </p:cNvPr>
+          <p:cNvSpPr/>
+          <p:nvPr/>
+        </p:nvSpPr>
+        <p:spPr>
+          <a:xfrm>
+            <a:off x="6973950" y="6812969"/>
+            <a:ext cx="1519727" cy="765069"/>
+          </a:xfrm>
+          <a:prstGeom prst="roundRect">
+            <a:avLst/>
+          </a:prstGeom>
+        </p:spPr>
+        <p:style>
+          <a:lnRef idx="2">
+            <a:schemeClr val="accent1">
+              <a:shade val="50000"/>
+            </a:schemeClr>
+          </a:lnRef>
+          <a:fillRef idx="1">
+            <a:schemeClr val="accent1"/>
+          </a:fillRef>
+          <a:effectRef idx="0">
+            <a:schemeClr val="accent1"/>
+          </a:effectRef>
+          <a:fontRef idx="minor">
+            <a:schemeClr val="lt1"/>
+          </a:fontRef>
+        </p:style>
+        <p:txBody>
+          <a:bodyPr rtlCol="0" anchor="ctr"/>
+          <a:lstStyle/>
+          <a:p>
+            <a:pPr algn="ctr"/>
+            <a:r>
+              <a:rPr lang="en-US" sz="2500" dirty="0"/>
+              <a:t>Chicken and Pork</a:t>
+            </a:r>
+          </a:p>
+        </p:txBody>
+      </p:sp>
+      <p:cxnSp>
+        <p:nvCxnSpPr>
+          <p:cNvPr id="13" name="Straight Arrow Connector 12">
+            <a:extLst>
+              <a:ext uri="{FF2B5EF4-FFF2-40B4-BE49-F238E27FC236}">
+                <a16:creationId xmlns:a16="http://schemas.microsoft.com/office/drawing/2014/main" id="{D9126CEC-51A3-00F5-C0B7-0DE5C6F43E03}"/>
+              </a:ext>
+            </a:extLst>
+          </p:cNvPr>
+          <p:cNvCxnSpPr>
+            <a:cxnSpLocks/>
+          </p:cNvCxnSpPr>
+          <p:nvPr/>
+        </p:nvCxnSpPr>
+        <p:spPr>
+          <a:xfrm>
+            <a:off x="7772398" y="6317537"/>
+            <a:ext cx="0" cy="495433"/>
+          </a:xfrm>
+          <a:prstGeom prst="straightConnector1">
+            <a:avLst/>
+          </a:prstGeom>
+          <a:ln>
+            <a:tailEnd type="triangle"/>
+          </a:ln>
+        </p:spPr>
+        <p:style>
+          <a:lnRef idx="1">
+            <a:schemeClr val="accent1"/>
+          </a:lnRef>
+          <a:fillRef idx="0">
+            <a:schemeClr val="accent1"/>
+          </a:fillRef>
+          <a:effectRef idx="0">
+            <a:schemeClr val="accent1"/>
+          </a:effectRef>
+          <a:fontRef idx="minor">
+            <a:schemeClr val="tx1"/>
+          </a:fontRef>
+        </p:style>
+      </p:cxnSp>
+      <p:sp>
+        <p:nvSpPr>
+          <p:cNvPr id="15" name="Rectangle: Rounded Corners 14">
+            <a:extLst>
+              <a:ext uri="{FF2B5EF4-FFF2-40B4-BE49-F238E27FC236}">
+                <a16:creationId xmlns:a16="http://schemas.microsoft.com/office/drawing/2014/main" id="{A0267343-3537-DC4B-8197-409AD68B232A}"/>
+              </a:ext>
+            </a:extLst>
+          </p:cNvPr>
+          <p:cNvSpPr/>
+          <p:nvPr/>
+        </p:nvSpPr>
+        <p:spPr>
+          <a:xfrm>
+            <a:off x="5035822" y="5905499"/>
+            <a:ext cx="1143000" cy="785215"/>
+          </a:xfrm>
+          <a:prstGeom prst="roundRect">
+            <a:avLst/>
+          </a:prstGeom>
+        </p:spPr>
+        <p:style>
+          <a:lnRef idx="2">
+            <a:schemeClr val="accent1">
+              <a:shade val="50000"/>
+            </a:schemeClr>
+          </a:lnRef>
+          <a:fillRef idx="1">
+            <a:schemeClr val="accent1"/>
+          </a:fillRef>
+          <a:effectRef idx="0">
+            <a:schemeClr val="accent1"/>
+          </a:effectRef>
+          <a:fontRef idx="minor">
+            <a:schemeClr val="lt1"/>
+          </a:fontRef>
+        </p:style>
+        <p:txBody>
+          <a:bodyPr rtlCol="0" anchor="ctr"/>
+          <a:lstStyle/>
+          <a:p>
+            <a:pPr algn="ctr"/>
+            <a:r>
+              <a:rPr lang="en-US" sz="2500" dirty="0"/>
+              <a:t>Dash Board</a:t>
+            </a:r>
+          </a:p>
+        </p:txBody>
+      </p:sp>
+      <p:cxnSp>
+        <p:nvCxnSpPr>
+          <p:cNvPr id="17" name="Straight Arrow Connector 16">
+            <a:extLst>
+              <a:ext uri="{FF2B5EF4-FFF2-40B4-BE49-F238E27FC236}">
+                <a16:creationId xmlns:a16="http://schemas.microsoft.com/office/drawing/2014/main" id="{AE2998E3-4B49-775E-2AAC-739A5063E3C4}"/>
+              </a:ext>
+            </a:extLst>
+          </p:cNvPr>
+          <p:cNvCxnSpPr>
+            <a:cxnSpLocks/>
+          </p:cNvCxnSpPr>
+          <p:nvPr/>
+        </p:nvCxnSpPr>
+        <p:spPr>
+          <a:xfrm flipH="1">
+            <a:off x="5562599" y="5483630"/>
+            <a:ext cx="1" cy="421870"/>
+          </a:xfrm>
+          <a:prstGeom prst="straightConnector1">
+            <a:avLst/>
+          </a:prstGeom>
+          <a:ln>
+            <a:tailEnd type="triangle"/>
+          </a:ln>
+        </p:spPr>
+        <p:style>
+          <a:lnRef idx="1">
+            <a:schemeClr val="accent1"/>
+          </a:lnRef>
+          <a:fillRef idx="0">
+            <a:schemeClr val="accent1"/>
+          </a:fillRef>
+          <a:effectRef idx="0">
+            <a:schemeClr val="accent1"/>
+          </a:effectRef>
+          <a:fontRef idx="minor">
+            <a:schemeClr val="tx1"/>
+          </a:fontRef>
+        </p:style>
+      </p:cxnSp>
+      <p:sp>
+        <p:nvSpPr>
+          <p:cNvPr id="18" name="Rectangle: Rounded Corners 17">
+            <a:extLst>
+              <a:ext uri="{FF2B5EF4-FFF2-40B4-BE49-F238E27FC236}">
+                <a16:creationId xmlns:a16="http://schemas.microsoft.com/office/drawing/2014/main" id="{AA8FB5A4-9037-3FE6-56D6-39B2065D14C7}"/>
+              </a:ext>
+            </a:extLst>
+          </p:cNvPr>
+          <p:cNvSpPr/>
+          <p:nvPr/>
+        </p:nvSpPr>
+        <p:spPr>
+          <a:xfrm>
+            <a:off x="4802738" y="7195503"/>
+            <a:ext cx="1519721" cy="785215"/>
+          </a:xfrm>
+          <a:prstGeom prst="roundRect">
+            <a:avLst/>
+          </a:prstGeom>
+        </p:spPr>
+        <p:style>
+          <a:lnRef idx="2">
+            <a:schemeClr val="accent1">
+              <a:shade val="50000"/>
+            </a:schemeClr>
+          </a:lnRef>
+          <a:fillRef idx="1">
+            <a:schemeClr val="accent1"/>
+          </a:fillRef>
+          <a:effectRef idx="0">
+            <a:schemeClr val="accent1"/>
+          </a:effectRef>
+          <a:fontRef idx="minor">
+            <a:schemeClr val="lt1"/>
+          </a:fontRef>
+        </p:style>
+        <p:txBody>
+          <a:bodyPr rtlCol="0" anchor="ctr"/>
+          <a:lstStyle/>
+          <a:p>
+            <a:pPr algn="ctr"/>
+            <a:r>
+              <a:rPr lang="en-US" sz="2500" dirty="0"/>
+              <a:t>Menu Highlight</a:t>
+            </a:r>
+          </a:p>
+        </p:txBody>
+      </p:sp>
+      <p:cxnSp>
+        <p:nvCxnSpPr>
+          <p:cNvPr id="19" name="Straight Arrow Connector 18">
+            <a:extLst>
+              <a:ext uri="{FF2B5EF4-FFF2-40B4-BE49-F238E27FC236}">
+                <a16:creationId xmlns:a16="http://schemas.microsoft.com/office/drawing/2014/main" id="{468AB54F-0EB4-768B-F648-3F8935384238}"/>
+              </a:ext>
+            </a:extLst>
+          </p:cNvPr>
+          <p:cNvCxnSpPr>
+            <a:cxnSpLocks/>
+          </p:cNvCxnSpPr>
+          <p:nvPr/>
+        </p:nvCxnSpPr>
+        <p:spPr>
+          <a:xfrm>
+            <a:off x="5607320" y="6690714"/>
+            <a:ext cx="0" cy="495433"/>
+          </a:xfrm>
+          <a:prstGeom prst="straightConnector1">
+            <a:avLst/>
+          </a:prstGeom>
+          <a:ln>
+            <a:tailEnd type="triangle"/>
+          </a:ln>
+        </p:spPr>
+        <p:style>
+          <a:lnRef idx="1">
+            <a:schemeClr val="accent1"/>
+          </a:lnRef>
+          <a:fillRef idx="0">
+            <a:schemeClr val="accent1"/>
+          </a:fillRef>
+          <a:effectRef idx="0">
+            <a:schemeClr val="accent1"/>
+          </a:effectRef>
+          <a:fontRef idx="minor">
+            <a:schemeClr val="tx1"/>
+          </a:fontRef>
+        </p:style>
+      </p:cxnSp>
+      <p:sp>
+        <p:nvSpPr>
+          <p:cNvPr id="20" name="Rectangle: Rounded Corners 19">
+            <a:extLst>
+              <a:ext uri="{FF2B5EF4-FFF2-40B4-BE49-F238E27FC236}">
+                <a16:creationId xmlns:a16="http://schemas.microsoft.com/office/drawing/2014/main" id="{A7034303-6FA5-BD11-3DBA-718101EBE7BC}"/>
+              </a:ext>
+            </a:extLst>
+          </p:cNvPr>
+          <p:cNvSpPr/>
+          <p:nvPr/>
+        </p:nvSpPr>
+        <p:spPr>
+          <a:xfrm>
+            <a:off x="4802738" y="8420100"/>
+            <a:ext cx="1519721" cy="785215"/>
+          </a:xfrm>
+          <a:prstGeom prst="roundRect">
+            <a:avLst/>
+          </a:prstGeom>
+        </p:spPr>
+        <p:style>
+          <a:lnRef idx="2">
+            <a:schemeClr val="accent1">
+              <a:shade val="50000"/>
+            </a:schemeClr>
+          </a:lnRef>
+          <a:fillRef idx="1">
+            <a:schemeClr val="accent1"/>
+          </a:fillRef>
+          <a:effectRef idx="0">
+            <a:schemeClr val="accent1"/>
+          </a:effectRef>
+          <a:fontRef idx="minor">
+            <a:schemeClr val="lt1"/>
+          </a:fontRef>
+        </p:style>
+        <p:txBody>
+          <a:bodyPr rtlCol="0" anchor="ctr"/>
+          <a:lstStyle/>
+          <a:p>
+            <a:pPr algn="ctr"/>
+            <a:r>
+              <a:rPr lang="en-US" sz="2500" dirty="0"/>
+              <a:t>Customer Reviews</a:t>
+            </a:r>
+          </a:p>
+        </p:txBody>
+      </p:sp>
+      <p:cxnSp>
+        <p:nvCxnSpPr>
+          <p:cNvPr id="21" name="Straight Arrow Connector 20">
+            <a:extLst>
+              <a:ext uri="{FF2B5EF4-FFF2-40B4-BE49-F238E27FC236}">
+                <a16:creationId xmlns:a16="http://schemas.microsoft.com/office/drawing/2014/main" id="{897A11EB-96FB-A8FA-EED4-EA90D79FDCEE}"/>
+              </a:ext>
+            </a:extLst>
+          </p:cNvPr>
+          <p:cNvCxnSpPr>
+            <a:cxnSpLocks/>
+          </p:cNvCxnSpPr>
+          <p:nvPr/>
+        </p:nvCxnSpPr>
+        <p:spPr>
+          <a:xfrm>
+            <a:off x="5607320" y="7913309"/>
+            <a:ext cx="0" cy="495433"/>
           </a:xfrm>
           <a:prstGeom prst="straightConnector1">
             <a:avLst/>

</xml_diff>

<commit_message>
modified:   Proposal/MP1 Asher.pptx 	modified:   index.html
</commit_message>
<xml_diff>
--- a/Proposal/MP1 Asher.pptx
+++ b/Proposal/MP1 Asher.pptx
@@ -6,12 +6,12 @@
   </p:sldMasterIdLst>
   <p:sldIdLst>
     <p:sldId id="256" r:id="rId2"/>
-    <p:sldId id="257" r:id="rId3"/>
-    <p:sldId id="258" r:id="rId4"/>
-    <p:sldId id="260" r:id="rId5"/>
-    <p:sldId id="265" r:id="rId6"/>
-    <p:sldId id="261" r:id="rId7"/>
-    <p:sldId id="263" r:id="rId8"/>
+    <p:sldId id="261" r:id="rId3"/>
+    <p:sldId id="257" r:id="rId4"/>
+    <p:sldId id="258" r:id="rId5"/>
+    <p:sldId id="263" r:id="rId6"/>
+    <p:sldId id="260" r:id="rId7"/>
+    <p:sldId id="265" r:id="rId8"/>
     <p:sldId id="266" r:id="rId9"/>
   </p:sldIdLst>
   <p:sldSz cx="18288000" cy="10287000"/>
@@ -150,13 +150,275 @@
 <file path=ppt/revisionInfo.xml><?xml version="1.0" encoding="utf-8"?>
 <p1510:revInfo xmlns:a="http://schemas.openxmlformats.org/drawingml/2006/main" xmlns:r="http://schemas.openxmlformats.org/officeDocument/2006/relationships" xmlns:p1510="http://schemas.microsoft.com/office/powerpoint/2015/10/main">
   <p1510:revLst>
-    <p1510:client id="{DDC23D58-17AC-4D35-A60B-909B34B5002F}" v="46" dt="2023-05-14T14:59:01.389"/>
+    <p1510:client id="{0D1DB70E-C541-45F3-8313-E77C6D7C57B2}" v="5" dt="2023-06-05T11:34:11.518"/>
   </p1510:revLst>
 </p1510:revInfo>
 </file>
 
 <file path=ppt/changesInfos/changesInfo1.xml><?xml version="1.0" encoding="utf-8"?>
 <pc:chgInfo xmlns:a="http://schemas.openxmlformats.org/drawingml/2006/main" xmlns:r="http://schemas.openxmlformats.org/officeDocument/2006/relationships" xmlns:ac="http://schemas.microsoft.com/office/drawing/2013/main/command" xmlns:pc="http://schemas.microsoft.com/office/powerpoint/2013/main/command">
+  <pc:docChgLst>
+    <pc:chgData name="Asher A. Federico" userId="cd7a243a-c1f3-4c9b-91c6-981eb251bbbc" providerId="ADAL" clId="{D81F8D78-C29F-47EA-AE89-4E18C73C5D91}"/>
+    <pc:docChg chg="custSel modSld sldOrd">
+      <pc:chgData name="Asher A. Federico" userId="cd7a243a-c1f3-4c9b-91c6-981eb251bbbc" providerId="ADAL" clId="{D81F8D78-C29F-47EA-AE89-4E18C73C5D91}" dt="2023-06-06T11:04:53.585" v="14"/>
+      <pc:docMkLst>
+        <pc:docMk/>
+      </pc:docMkLst>
+      <pc:sldChg chg="delSp modSp mod">
+        <pc:chgData name="Asher A. Federico" userId="cd7a243a-c1f3-4c9b-91c6-981eb251bbbc" providerId="ADAL" clId="{D81F8D78-C29F-47EA-AE89-4E18C73C5D91}" dt="2023-06-06T11:04:01.527" v="6" actId="478"/>
+        <pc:sldMkLst>
+          <pc:docMk/>
+          <pc:sldMk cId="0" sldId="260"/>
+        </pc:sldMkLst>
+        <pc:spChg chg="del">
+          <ac:chgData name="Asher A. Federico" userId="cd7a243a-c1f3-4c9b-91c6-981eb251bbbc" providerId="ADAL" clId="{D81F8D78-C29F-47EA-AE89-4E18C73C5D91}" dt="2023-06-06T11:03:58.823" v="5" actId="478"/>
+          <ac:spMkLst>
+            <pc:docMk/>
+            <pc:sldMk cId="0" sldId="260"/>
+            <ac:spMk id="2" creationId="{A2940734-59D8-888A-4560-BFB12EB24081}"/>
+          </ac:spMkLst>
+        </pc:spChg>
+        <pc:spChg chg="del mod">
+          <ac:chgData name="Asher A. Federico" userId="cd7a243a-c1f3-4c9b-91c6-981eb251bbbc" providerId="ADAL" clId="{D81F8D78-C29F-47EA-AE89-4E18C73C5D91}" dt="2023-06-06T11:03:43.770" v="1" actId="478"/>
+          <ac:spMkLst>
+            <pc:docMk/>
+            <pc:sldMk cId="0" sldId="260"/>
+            <ac:spMk id="4" creationId="{578AAEEB-720D-915B-7E12-966EF6400B1E}"/>
+          </ac:spMkLst>
+        </pc:spChg>
+        <pc:spChg chg="del">
+          <ac:chgData name="Asher A. Federico" userId="cd7a243a-c1f3-4c9b-91c6-981eb251bbbc" providerId="ADAL" clId="{D81F8D78-C29F-47EA-AE89-4E18C73C5D91}" dt="2023-06-06T11:04:01.527" v="6" actId="478"/>
+          <ac:spMkLst>
+            <pc:docMk/>
+            <pc:sldMk cId="0" sldId="260"/>
+            <ac:spMk id="50" creationId="{2B171CA6-0355-BD37-FFA8-F3A60D3D26F6}"/>
+          </ac:spMkLst>
+        </pc:spChg>
+        <pc:spChg chg="mod">
+          <ac:chgData name="Asher A. Federico" userId="cd7a243a-c1f3-4c9b-91c6-981eb251bbbc" providerId="ADAL" clId="{D81F8D78-C29F-47EA-AE89-4E18C73C5D91}" dt="2023-06-06T11:03:55.079" v="4" actId="1076"/>
+          <ac:spMkLst>
+            <pc:docMk/>
+            <pc:sldMk cId="0" sldId="260"/>
+            <ac:spMk id="54" creationId="{7578D4AF-6561-BEE0-E7DE-A3E6041C5A48}"/>
+          </ac:spMkLst>
+        </pc:spChg>
+        <pc:spChg chg="mod">
+          <ac:chgData name="Asher A. Federico" userId="cd7a243a-c1f3-4c9b-91c6-981eb251bbbc" providerId="ADAL" clId="{D81F8D78-C29F-47EA-AE89-4E18C73C5D91}" dt="2023-06-06T11:03:55.079" v="4" actId="1076"/>
+          <ac:spMkLst>
+            <pc:docMk/>
+            <pc:sldMk cId="0" sldId="260"/>
+            <ac:spMk id="114" creationId="{C4AE4235-FEF9-6B7E-69C2-7EF4151FCBE2}"/>
+          </ac:spMkLst>
+        </pc:spChg>
+        <pc:cxnChg chg="del">
+          <ac:chgData name="Asher A. Federico" userId="cd7a243a-c1f3-4c9b-91c6-981eb251bbbc" providerId="ADAL" clId="{D81F8D78-C29F-47EA-AE89-4E18C73C5D91}" dt="2023-06-06T11:03:46.599" v="2" actId="478"/>
+          <ac:cxnSpMkLst>
+            <pc:docMk/>
+            <pc:sldMk cId="0" sldId="260"/>
+            <ac:cxnSpMk id="5" creationId="{E5B834BB-BFA0-1EB2-85DD-49E6B39EBA46}"/>
+          </ac:cxnSpMkLst>
+        </pc:cxnChg>
+        <pc:cxnChg chg="del">
+          <ac:chgData name="Asher A. Federico" userId="cd7a243a-c1f3-4c9b-91c6-981eb251bbbc" providerId="ADAL" clId="{D81F8D78-C29F-47EA-AE89-4E18C73C5D91}" dt="2023-06-06T11:03:49.559" v="3" actId="478"/>
+          <ac:cxnSpMkLst>
+            <pc:docMk/>
+            <pc:sldMk cId="0" sldId="260"/>
+            <ac:cxnSpMk id="13" creationId="{6AC3092B-7FE1-E03C-546B-17F4EF401F85}"/>
+          </ac:cxnSpMkLst>
+        </pc:cxnChg>
+        <pc:cxnChg chg="mod">
+          <ac:chgData name="Asher A. Federico" userId="cd7a243a-c1f3-4c9b-91c6-981eb251bbbc" providerId="ADAL" clId="{D81F8D78-C29F-47EA-AE89-4E18C73C5D91}" dt="2023-06-06T11:03:55.079" v="4" actId="1076"/>
+          <ac:cxnSpMkLst>
+            <pc:docMk/>
+            <pc:sldMk cId="0" sldId="260"/>
+            <ac:cxnSpMk id="119" creationId="{AEEF2D39-0BE2-BFCD-623A-61B138426F84}"/>
+          </ac:cxnSpMkLst>
+        </pc:cxnChg>
+      </pc:sldChg>
+      <pc:sldChg chg="ord">
+        <pc:chgData name="Asher A. Federico" userId="cd7a243a-c1f3-4c9b-91c6-981eb251bbbc" providerId="ADAL" clId="{D81F8D78-C29F-47EA-AE89-4E18C73C5D91}" dt="2023-06-06T11:04:53.585" v="14"/>
+        <pc:sldMkLst>
+          <pc:docMk/>
+          <pc:sldMk cId="0" sldId="261"/>
+        </pc:sldMkLst>
+      </pc:sldChg>
+      <pc:sldChg chg="ord">
+        <pc:chgData name="Asher A. Federico" userId="cd7a243a-c1f3-4c9b-91c6-981eb251bbbc" providerId="ADAL" clId="{D81F8D78-C29F-47EA-AE89-4E18C73C5D91}" dt="2023-06-06T11:04:48.573" v="12"/>
+        <pc:sldMkLst>
+          <pc:docMk/>
+          <pc:sldMk cId="0" sldId="263"/>
+        </pc:sldMkLst>
+      </pc:sldChg>
+    </pc:docChg>
+  </pc:docChgLst>
+  <pc:docChgLst>
+    <pc:chgData name="Asher A. Federico" userId="cd7a243a-c1f3-4c9b-91c6-981eb251bbbc" providerId="ADAL" clId="{0D1DB70E-C541-45F3-8313-E77C6D7C57B2}"/>
+    <pc:docChg chg="undo custSel modSld">
+      <pc:chgData name="Asher A. Federico" userId="cd7a243a-c1f3-4c9b-91c6-981eb251bbbc" providerId="ADAL" clId="{0D1DB70E-C541-45F3-8313-E77C6D7C57B2}" dt="2023-06-05T11:34:27.719" v="132" actId="20577"/>
+      <pc:docMkLst>
+        <pc:docMk/>
+      </pc:docMkLst>
+      <pc:sldChg chg="addSp delSp modSp mod">
+        <pc:chgData name="Asher A. Federico" userId="cd7a243a-c1f3-4c9b-91c6-981eb251bbbc" providerId="ADAL" clId="{0D1DB70E-C541-45F3-8313-E77C6D7C57B2}" dt="2023-06-05T11:34:27.719" v="132" actId="20577"/>
+        <pc:sldMkLst>
+          <pc:docMk/>
+          <pc:sldMk cId="0" sldId="260"/>
+        </pc:sldMkLst>
+        <pc:spChg chg="add mod">
+          <ac:chgData name="Asher A. Federico" userId="cd7a243a-c1f3-4c9b-91c6-981eb251bbbc" providerId="ADAL" clId="{0D1DB70E-C541-45F3-8313-E77C6D7C57B2}" dt="2023-06-05T11:32:10.642" v="51" actId="1076"/>
+          <ac:spMkLst>
+            <pc:docMk/>
+            <pc:sldMk cId="0" sldId="260"/>
+            <ac:spMk id="2" creationId="{A2940734-59D8-888A-4560-BFB12EB24081}"/>
+          </ac:spMkLst>
+        </pc:spChg>
+        <pc:spChg chg="add mod">
+          <ac:chgData name="Asher A. Federico" userId="cd7a243a-c1f3-4c9b-91c6-981eb251bbbc" providerId="ADAL" clId="{0D1DB70E-C541-45F3-8313-E77C6D7C57B2}" dt="2023-06-05T11:33:58.964" v="113" actId="14100"/>
+          <ac:spMkLst>
+            <pc:docMk/>
+            <pc:sldMk cId="0" sldId="260"/>
+            <ac:spMk id="4" creationId="{578AAEEB-720D-915B-7E12-966EF6400B1E}"/>
+          </ac:spMkLst>
+        </pc:spChg>
+        <pc:spChg chg="mod">
+          <ac:chgData name="Asher A. Federico" userId="cd7a243a-c1f3-4c9b-91c6-981eb251bbbc" providerId="ADAL" clId="{0D1DB70E-C541-45F3-8313-E77C6D7C57B2}" dt="2023-06-05T11:18:50.259" v="8" actId="20577"/>
+          <ac:spMkLst>
+            <pc:docMk/>
+            <pc:sldMk cId="0" sldId="260"/>
+            <ac:spMk id="45" creationId="{054E8860-C04C-DBBD-E003-173B0ED654EA}"/>
+          </ac:spMkLst>
+        </pc:spChg>
+        <pc:spChg chg="mod">
+          <ac:chgData name="Asher A. Federico" userId="cd7a243a-c1f3-4c9b-91c6-981eb251bbbc" providerId="ADAL" clId="{0D1DB70E-C541-45F3-8313-E77C6D7C57B2}" dt="2023-06-05T11:34:27.719" v="132" actId="20577"/>
+          <ac:spMkLst>
+            <pc:docMk/>
+            <pc:sldMk cId="0" sldId="260"/>
+            <ac:spMk id="49" creationId="{BA2D6F04-4E48-E66D-6E5B-32B42292F4A7}"/>
+          </ac:spMkLst>
+        </pc:spChg>
+        <pc:spChg chg="mod">
+          <ac:chgData name="Asher A. Federico" userId="cd7a243a-c1f3-4c9b-91c6-981eb251bbbc" providerId="ADAL" clId="{0D1DB70E-C541-45F3-8313-E77C6D7C57B2}" dt="2023-06-05T11:32:36.373" v="89" actId="20577"/>
+          <ac:spMkLst>
+            <pc:docMk/>
+            <pc:sldMk cId="0" sldId="260"/>
+            <ac:spMk id="50" creationId="{2B171CA6-0355-BD37-FFA8-F3A60D3D26F6}"/>
+          </ac:spMkLst>
+        </pc:spChg>
+        <pc:spChg chg="del">
+          <ac:chgData name="Asher A. Federico" userId="cd7a243a-c1f3-4c9b-91c6-981eb251bbbc" providerId="ADAL" clId="{0D1DB70E-C541-45F3-8313-E77C6D7C57B2}" dt="2023-06-05T11:19:04.219" v="11" actId="478"/>
+          <ac:spMkLst>
+            <pc:docMk/>
+            <pc:sldMk cId="0" sldId="260"/>
+            <ac:spMk id="51" creationId="{E0E1D2A0-A07B-4AE3-233A-A17E075DAA5C}"/>
+          </ac:spMkLst>
+        </pc:spChg>
+        <pc:spChg chg="del">
+          <ac:chgData name="Asher A. Federico" userId="cd7a243a-c1f3-4c9b-91c6-981eb251bbbc" providerId="ADAL" clId="{0D1DB70E-C541-45F3-8313-E77C6D7C57B2}" dt="2023-06-05T11:19:08.739" v="12" actId="478"/>
+          <ac:spMkLst>
+            <pc:docMk/>
+            <pc:sldMk cId="0" sldId="260"/>
+            <ac:spMk id="53" creationId="{F7F71B56-2CF2-9D6F-8A03-70FC734E31A8}"/>
+          </ac:spMkLst>
+        </pc:spChg>
+        <pc:spChg chg="mod">
+          <ac:chgData name="Asher A. Federico" userId="cd7a243a-c1f3-4c9b-91c6-981eb251bbbc" providerId="ADAL" clId="{0D1DB70E-C541-45F3-8313-E77C6D7C57B2}" dt="2023-06-05T11:34:06.344" v="114" actId="1076"/>
+          <ac:spMkLst>
+            <pc:docMk/>
+            <pc:sldMk cId="0" sldId="260"/>
+            <ac:spMk id="54" creationId="{7578D4AF-6561-BEE0-E7DE-A3E6041C5A48}"/>
+          </ac:spMkLst>
+        </pc:spChg>
+        <pc:spChg chg="mod">
+          <ac:chgData name="Asher A. Federico" userId="cd7a243a-c1f3-4c9b-91c6-981eb251bbbc" providerId="ADAL" clId="{0D1DB70E-C541-45F3-8313-E77C6D7C57B2}" dt="2023-06-05T11:30:44.682" v="28" actId="20577"/>
+          <ac:spMkLst>
+            <pc:docMk/>
+            <pc:sldMk cId="0" sldId="260"/>
+            <ac:spMk id="57" creationId="{343C141B-A114-69AC-C210-5B580869B0F4}"/>
+          </ac:spMkLst>
+        </pc:spChg>
+        <pc:spChg chg="del mod">
+          <ac:chgData name="Asher A. Federico" userId="cd7a243a-c1f3-4c9b-91c6-981eb251bbbc" providerId="ADAL" clId="{0D1DB70E-C541-45F3-8313-E77C6D7C57B2}" dt="2023-06-05T11:19:00.607" v="10" actId="478"/>
+          <ac:spMkLst>
+            <pc:docMk/>
+            <pc:sldMk cId="0" sldId="260"/>
+            <ac:spMk id="58" creationId="{E6519461-8ECD-9C77-90C7-F49BB5325874}"/>
+          </ac:spMkLst>
+        </pc:spChg>
+        <pc:spChg chg="mod">
+          <ac:chgData name="Asher A. Federico" userId="cd7a243a-c1f3-4c9b-91c6-981eb251bbbc" providerId="ADAL" clId="{0D1DB70E-C541-45F3-8313-E77C6D7C57B2}" dt="2023-06-05T11:34:06.344" v="114" actId="1076"/>
+          <ac:spMkLst>
+            <pc:docMk/>
+            <pc:sldMk cId="0" sldId="260"/>
+            <ac:spMk id="114" creationId="{C4AE4235-FEF9-6B7E-69C2-7EF4151FCBE2}"/>
+          </ac:spMkLst>
+        </pc:spChg>
+        <pc:cxnChg chg="add mod">
+          <ac:chgData name="Asher A. Federico" userId="cd7a243a-c1f3-4c9b-91c6-981eb251bbbc" providerId="ADAL" clId="{0D1DB70E-C541-45F3-8313-E77C6D7C57B2}" dt="2023-06-05T11:32:17.521" v="53" actId="1076"/>
+          <ac:cxnSpMkLst>
+            <pc:docMk/>
+            <pc:sldMk cId="0" sldId="260"/>
+            <ac:cxnSpMk id="3" creationId="{74C15BB9-1399-9FBA-AD5E-953E7A41193C}"/>
+          </ac:cxnSpMkLst>
+        </pc:cxnChg>
+        <pc:cxnChg chg="add mod">
+          <ac:chgData name="Asher A. Federico" userId="cd7a243a-c1f3-4c9b-91c6-981eb251bbbc" providerId="ADAL" clId="{0D1DB70E-C541-45F3-8313-E77C6D7C57B2}" dt="2023-06-05T11:33:22.972" v="94" actId="1076"/>
+          <ac:cxnSpMkLst>
+            <pc:docMk/>
+            <pc:sldMk cId="0" sldId="260"/>
+            <ac:cxnSpMk id="5" creationId="{E5B834BB-BFA0-1EB2-85DD-49E6B39EBA46}"/>
+          </ac:cxnSpMkLst>
+        </pc:cxnChg>
+        <pc:cxnChg chg="add mod">
+          <ac:chgData name="Asher A. Federico" userId="cd7a243a-c1f3-4c9b-91c6-981eb251bbbc" providerId="ADAL" clId="{0D1DB70E-C541-45F3-8313-E77C6D7C57B2}" dt="2023-06-05T11:34:17.898" v="116" actId="1076"/>
+          <ac:cxnSpMkLst>
+            <pc:docMk/>
+            <pc:sldMk cId="0" sldId="260"/>
+            <ac:cxnSpMk id="13" creationId="{6AC3092B-7FE1-E03C-546B-17F4EF401F85}"/>
+          </ac:cxnSpMkLst>
+        </pc:cxnChg>
+        <pc:cxnChg chg="add del mod">
+          <ac:chgData name="Asher A. Federico" userId="cd7a243a-c1f3-4c9b-91c6-981eb251bbbc" providerId="ADAL" clId="{0D1DB70E-C541-45F3-8313-E77C6D7C57B2}" dt="2023-06-05T11:31:00.032" v="33" actId="1076"/>
+          <ac:cxnSpMkLst>
+            <pc:docMk/>
+            <pc:sldMk cId="0" sldId="260"/>
+            <ac:cxnSpMk id="79" creationId="{99070B85-4DF7-DE9B-7D21-1AD4AA0FB75B}"/>
+          </ac:cxnSpMkLst>
+        </pc:cxnChg>
+        <pc:cxnChg chg="del">
+          <ac:chgData name="Asher A. Federico" userId="cd7a243a-c1f3-4c9b-91c6-981eb251bbbc" providerId="ADAL" clId="{0D1DB70E-C541-45F3-8313-E77C6D7C57B2}" dt="2023-06-05T11:30:51.337" v="30" actId="478"/>
+          <ac:cxnSpMkLst>
+            <pc:docMk/>
+            <pc:sldMk cId="0" sldId="260"/>
+            <ac:cxnSpMk id="107" creationId="{BA15EB2C-5BC8-7992-3774-BC45D93AEE18}"/>
+          </ac:cxnSpMkLst>
+        </pc:cxnChg>
+        <pc:cxnChg chg="del">
+          <ac:chgData name="Asher A. Federico" userId="cd7a243a-c1f3-4c9b-91c6-981eb251bbbc" providerId="ADAL" clId="{0D1DB70E-C541-45F3-8313-E77C6D7C57B2}" dt="2023-06-05T11:30:48.747" v="29" actId="478"/>
+          <ac:cxnSpMkLst>
+            <pc:docMk/>
+            <pc:sldMk cId="0" sldId="260"/>
+            <ac:cxnSpMk id="109" creationId="{C4295F96-9148-821F-87C6-7255B0C78145}"/>
+          </ac:cxnSpMkLst>
+        </pc:cxnChg>
+        <pc:cxnChg chg="mod">
+          <ac:chgData name="Asher A. Federico" userId="cd7a243a-c1f3-4c9b-91c6-981eb251bbbc" providerId="ADAL" clId="{0D1DB70E-C541-45F3-8313-E77C6D7C57B2}" dt="2023-06-05T11:19:20.504" v="13" actId="1076"/>
+          <ac:cxnSpMkLst>
+            <pc:docMk/>
+            <pc:sldMk cId="0" sldId="260"/>
+            <ac:cxnSpMk id="117" creationId="{E354DE76-D4B3-D6E7-297E-CE92C7A3235A}"/>
+          </ac:cxnSpMkLst>
+        </pc:cxnChg>
+        <pc:cxnChg chg="mod">
+          <ac:chgData name="Asher A. Federico" userId="cd7a243a-c1f3-4c9b-91c6-981eb251bbbc" providerId="ADAL" clId="{0D1DB70E-C541-45F3-8313-E77C6D7C57B2}" dt="2023-06-05T11:34:06.344" v="114" actId="1076"/>
+          <ac:cxnSpMkLst>
+            <pc:docMk/>
+            <pc:sldMk cId="0" sldId="260"/>
+            <ac:cxnSpMk id="119" creationId="{AEEF2D39-0BE2-BFCD-623A-61B138426F84}"/>
+          </ac:cxnSpMkLst>
+        </pc:cxnChg>
+      </pc:sldChg>
+    </pc:docChg>
+  </pc:docChgLst>
   <pc:docChgLst>
     <pc:chgData name="Asher A. Federico" userId="cd7a243a-c1f3-4c9b-91c6-981eb251bbbc" providerId="ADAL" clId="{DDC23D58-17AC-4D35-A60B-909B34B5002F}"/>
     <pc:docChg chg="undo custSel addSld delSld modSld sldOrd">
@@ -1518,7 +1780,7 @@
             <a:fld id="{1D8BD707-D9CF-40AE-B4C6-C98DA3205C09}" type="datetimeFigureOut">
               <a:rPr lang="en-US" smtClean="0"/>
               <a:pPr/>
-              <a:t>6/5/2023</a:t>
+              <a:t>6/6/2023</a:t>
             </a:fld>
             <a:endParaRPr lang="en-US"/>
           </a:p>
@@ -1683,7 +1945,7 @@
             <a:fld id="{1D8BD707-D9CF-40AE-B4C6-C98DA3205C09}" type="datetimeFigureOut">
               <a:rPr lang="en-US" smtClean="0"/>
               <a:pPr/>
-              <a:t>6/5/2023</a:t>
+              <a:t>6/6/2023</a:t>
             </a:fld>
             <a:endParaRPr lang="en-US"/>
           </a:p>
@@ -1858,7 +2120,7 @@
             <a:fld id="{1D8BD707-D9CF-40AE-B4C6-C98DA3205C09}" type="datetimeFigureOut">
               <a:rPr lang="en-US" smtClean="0"/>
               <a:pPr/>
-              <a:t>6/5/2023</a:t>
+              <a:t>6/6/2023</a:t>
             </a:fld>
             <a:endParaRPr lang="en-US"/>
           </a:p>
@@ -2023,7 +2285,7 @@
             <a:fld id="{1D8BD707-D9CF-40AE-B4C6-C98DA3205C09}" type="datetimeFigureOut">
               <a:rPr lang="en-US" smtClean="0"/>
               <a:pPr/>
-              <a:t>6/5/2023</a:t>
+              <a:t>6/6/2023</a:t>
             </a:fld>
             <a:endParaRPr lang="en-US"/>
           </a:p>
@@ -2265,7 +2527,7 @@
             <a:fld id="{1D8BD707-D9CF-40AE-B4C6-C98DA3205C09}" type="datetimeFigureOut">
               <a:rPr lang="en-US" smtClean="0"/>
               <a:pPr/>
-              <a:t>6/5/2023</a:t>
+              <a:t>6/6/2023</a:t>
             </a:fld>
             <a:endParaRPr lang="en-US"/>
           </a:p>
@@ -2547,7 +2809,7 @@
             <a:fld id="{1D8BD707-D9CF-40AE-B4C6-C98DA3205C09}" type="datetimeFigureOut">
               <a:rPr lang="en-US" smtClean="0"/>
               <a:pPr/>
-              <a:t>6/5/2023</a:t>
+              <a:t>6/6/2023</a:t>
             </a:fld>
             <a:endParaRPr lang="en-US"/>
           </a:p>
@@ -2963,7 +3225,7 @@
             <a:fld id="{1D8BD707-D9CF-40AE-B4C6-C98DA3205C09}" type="datetimeFigureOut">
               <a:rPr lang="en-US" smtClean="0"/>
               <a:pPr/>
-              <a:t>6/5/2023</a:t>
+              <a:t>6/6/2023</a:t>
             </a:fld>
             <a:endParaRPr lang="en-US"/>
           </a:p>
@@ -3077,7 +3339,7 @@
             <a:fld id="{1D8BD707-D9CF-40AE-B4C6-C98DA3205C09}" type="datetimeFigureOut">
               <a:rPr lang="en-US" smtClean="0"/>
               <a:pPr/>
-              <a:t>6/5/2023</a:t>
+              <a:t>6/6/2023</a:t>
             </a:fld>
             <a:endParaRPr lang="en-US"/>
           </a:p>
@@ -3169,7 +3431,7 @@
             <a:fld id="{1D8BD707-D9CF-40AE-B4C6-C98DA3205C09}" type="datetimeFigureOut">
               <a:rPr lang="en-US" smtClean="0"/>
               <a:pPr/>
-              <a:t>6/5/2023</a:t>
+              <a:t>6/6/2023</a:t>
             </a:fld>
             <a:endParaRPr lang="en-US"/>
           </a:p>
@@ -3441,7 +3703,7 @@
             <a:fld id="{1D8BD707-D9CF-40AE-B4C6-C98DA3205C09}" type="datetimeFigureOut">
               <a:rPr lang="en-US" smtClean="0"/>
               <a:pPr/>
-              <a:t>6/5/2023</a:t>
+              <a:t>6/6/2023</a:t>
             </a:fld>
             <a:endParaRPr lang="en-US"/>
           </a:p>
@@ -3690,7 +3952,7 @@
             <a:fld id="{1D8BD707-D9CF-40AE-B4C6-C98DA3205C09}" type="datetimeFigureOut">
               <a:rPr lang="en-US" smtClean="0"/>
               <a:pPr/>
-              <a:t>6/5/2023</a:t>
+              <a:t>6/6/2023</a:t>
             </a:fld>
             <a:endParaRPr lang="en-US"/>
           </a:p>
@@ -3898,7 +4160,7 @@
             <a:fld id="{1D8BD707-D9CF-40AE-B4C6-C98DA3205C09}" type="datetimeFigureOut">
               <a:rPr lang="en-US" smtClean="0"/>
               <a:pPr/>
-              <a:t>6/5/2023</a:t>
+              <a:t>6/6/2023</a:t>
             </a:fld>
             <a:endParaRPr lang="en-US"/>
           </a:p>
@@ -4682,6 +4944,463 @@
     <p:bg>
       <p:bgPr>
         <a:solidFill>
+          <a:schemeClr val="bg1"/>
+        </a:solidFill>
+        <a:effectLst/>
+      </p:bgPr>
+    </p:bg>
+    <p:spTree>
+      <p:nvGrpSpPr>
+        <p:cNvPr id="1" name=""/>
+        <p:cNvGrpSpPr/>
+        <p:nvPr/>
+      </p:nvGrpSpPr>
+      <p:grpSpPr>
+        <a:xfrm>
+          <a:off x="0" y="0"/>
+          <a:ext cx="0" cy="0"/>
+          <a:chOff x="0" y="0"/>
+          <a:chExt cx="0" cy="0"/>
+        </a:xfrm>
+      </p:grpSpPr>
+      <p:sp useBgFill="1">
+        <p:nvSpPr>
+          <p:cNvPr id="9" name="Rectangle 8">
+            <a:extLst>
+              <a:ext uri="{FF2B5EF4-FFF2-40B4-BE49-F238E27FC236}">
+                <a16:creationId xmlns:a16="http://schemas.microsoft.com/office/drawing/2014/main" id="{AB8C311F-7253-4AED-9701-7FC0708C41C7}"/>
+              </a:ext>
+              <a:ext uri="{C183D7F6-B498-43B3-948B-1728B52AA6E4}">
+                <adec:decorative xmlns:adec="http://schemas.microsoft.com/office/drawing/2017/decorative" val="1"/>
+              </a:ext>
+            </a:extLst>
+          </p:cNvPr>
+          <p:cNvSpPr>
+            <a:spLocks noGrp="1" noRot="1" noChangeAspect="1" noMove="1" noResize="1" noEditPoints="1" noAdjustHandles="1" noChangeArrowheads="1" noChangeShapeType="1" noTextEdit="1"/>
+          </p:cNvSpPr>
+          <p:nvPr>
+            <p:extLst>
+              <p:ext uri="{386F3935-93C4-4BCD-93E2-E3B085C9AB24}">
+                <p16:designElem xmlns:p16="http://schemas.microsoft.com/office/powerpoint/2015/main" val="1"/>
+              </p:ext>
+            </p:extLst>
+          </p:nvPr>
+        </p:nvSpPr>
+        <p:spPr>
+          <a:xfrm>
+            <a:off x="0" y="0"/>
+            <a:ext cx="18288000" cy="10287000"/>
+          </a:xfrm>
+          <a:prstGeom prst="rect">
+            <a:avLst/>
+          </a:prstGeom>
+          <a:ln w="12700" cap="flat" cmpd="sng" algn="ctr">
+            <a:noFill/>
+            <a:prstDash val="solid"/>
+            <a:miter lim="800000"/>
+          </a:ln>
+          <a:effectLst/>
+          <a:extLst>
+            <a:ext uri="{91240B29-F687-4F45-9708-019B960494DF}">
+              <a14:hiddenLine xmlns:a14="http://schemas.microsoft.com/office/drawing/2010/main" w="12700" cap="flat" cmpd="sng" algn="ctr">
+                <a:solidFill>
+                  <a:schemeClr val="accent1">
+                    <a:shade val="50000"/>
+                  </a:schemeClr>
+                </a:solidFill>
+                <a:prstDash val="solid"/>
+                <a:miter lim="800000"/>
+              </a14:hiddenLine>
+            </a:ext>
+          </a:extLst>
+        </p:spPr>
+        <p:style>
+          <a:lnRef idx="2">
+            <a:schemeClr val="accent1">
+              <a:shade val="50000"/>
+            </a:schemeClr>
+          </a:lnRef>
+          <a:fillRef idx="1">
+            <a:schemeClr val="accent1"/>
+          </a:fillRef>
+          <a:effectRef idx="0">
+            <a:schemeClr val="accent1"/>
+          </a:effectRef>
+          <a:fontRef idx="minor">
+            <a:schemeClr val="lt1"/>
+          </a:fontRef>
+        </p:style>
+        <p:txBody>
+          <a:bodyPr rtlCol="0" anchor="ctr"/>
+          <a:lstStyle/>
+          <a:p>
+            <a:pPr algn="ctr"/>
+            <a:endParaRPr lang="en-US"/>
+          </a:p>
+        </p:txBody>
+      </p:sp>
+      <p:sp>
+        <p:nvSpPr>
+          <p:cNvPr id="11" name="Rectangle 10">
+            <a:extLst>
+              <a:ext uri="{FF2B5EF4-FFF2-40B4-BE49-F238E27FC236}">
+                <a16:creationId xmlns:a16="http://schemas.microsoft.com/office/drawing/2014/main" id="{E2384209-CB15-4CDF-9D31-C44FD9A3F20D}"/>
+              </a:ext>
+              <a:ext uri="{C183D7F6-B498-43B3-948B-1728B52AA6E4}">
+                <adec:decorative xmlns:adec="http://schemas.microsoft.com/office/drawing/2017/decorative" val="1"/>
+              </a:ext>
+            </a:extLst>
+          </p:cNvPr>
+          <p:cNvSpPr>
+            <a:spLocks noGrp="1" noRot="1" noChangeAspect="1" noMove="1" noResize="1" noEditPoints="1" noAdjustHandles="1" noChangeArrowheads="1" noChangeShapeType="1" noTextEdit="1"/>
+          </p:cNvSpPr>
+          <p:nvPr>
+            <p:extLst>
+              <p:ext uri="{386F3935-93C4-4BCD-93E2-E3B085C9AB24}">
+                <p16:designElem xmlns:p16="http://schemas.microsoft.com/office/powerpoint/2015/main" val="1"/>
+              </p:ext>
+            </p:extLst>
+          </p:nvPr>
+        </p:nvSpPr>
+        <p:spPr>
+          <a:xfrm rot="16200000" flipH="1">
+            <a:off x="3999926" y="-3999282"/>
+            <a:ext cx="10287000" cy="18286850"/>
+          </a:xfrm>
+          <a:prstGeom prst="rect">
+            <a:avLst/>
+          </a:prstGeom>
+          <a:gradFill>
+            <a:gsLst>
+              <a:gs pos="8000">
+                <a:schemeClr val="accent1"/>
+              </a:gs>
+              <a:gs pos="100000">
+                <a:schemeClr val="accent1">
+                  <a:lumMod val="50000"/>
+                </a:schemeClr>
+              </a:gs>
+            </a:gsLst>
+            <a:lin ang="12000000" scaled="0"/>
+          </a:gradFill>
+          <a:ln>
+            <a:noFill/>
+          </a:ln>
+        </p:spPr>
+        <p:style>
+          <a:lnRef idx="2">
+            <a:schemeClr val="accent1">
+              <a:shade val="50000"/>
+            </a:schemeClr>
+          </a:lnRef>
+          <a:fillRef idx="1">
+            <a:schemeClr val="accent1"/>
+          </a:fillRef>
+          <a:effectRef idx="0">
+            <a:schemeClr val="accent1"/>
+          </a:effectRef>
+          <a:fontRef idx="minor">
+            <a:schemeClr val="lt1"/>
+          </a:fontRef>
+        </p:style>
+        <p:txBody>
+          <a:bodyPr rtlCol="0" anchor="ctr"/>
+          <a:lstStyle/>
+          <a:p>
+            <a:pPr algn="ctr"/>
+            <a:endParaRPr lang="en-US"/>
+          </a:p>
+        </p:txBody>
+      </p:sp>
+      <p:sp>
+        <p:nvSpPr>
+          <p:cNvPr id="13" name="Rectangle 12">
+            <a:extLst>
+              <a:ext uri="{FF2B5EF4-FFF2-40B4-BE49-F238E27FC236}">
+                <a16:creationId xmlns:a16="http://schemas.microsoft.com/office/drawing/2014/main" id="{2633B3B5-CC90-43F0-8714-D31D1F3F0209}"/>
+              </a:ext>
+              <a:ext uri="{C183D7F6-B498-43B3-948B-1728B52AA6E4}">
+                <adec:decorative xmlns:adec="http://schemas.microsoft.com/office/drawing/2017/decorative" val="1"/>
+              </a:ext>
+            </a:extLst>
+          </p:cNvPr>
+          <p:cNvSpPr>
+            <a:spLocks noGrp="1" noRot="1" noChangeAspect="1" noMove="1" noResize="1" noEditPoints="1" noAdjustHandles="1" noChangeArrowheads="1" noChangeShapeType="1" noTextEdit="1"/>
+          </p:cNvSpPr>
+          <p:nvPr>
+            <p:extLst>
+              <p:ext uri="{386F3935-93C4-4BCD-93E2-E3B085C9AB24}">
+                <p16:designElem xmlns:p16="http://schemas.microsoft.com/office/powerpoint/2015/main" val="1"/>
+              </p:ext>
+            </p:extLst>
+          </p:nvPr>
+        </p:nvSpPr>
+        <p:spPr>
+          <a:xfrm rot="10800000" flipH="1">
+            <a:off x="-3466" y="0"/>
+            <a:ext cx="13606268" cy="10286358"/>
+          </a:xfrm>
+          <a:prstGeom prst="rect">
+            <a:avLst/>
+          </a:prstGeom>
+          <a:gradFill>
+            <a:gsLst>
+              <a:gs pos="8000">
+                <a:srgbClr val="000000">
+                  <a:alpha val="52000"/>
+                </a:srgbClr>
+              </a:gs>
+              <a:gs pos="100000">
+                <a:schemeClr val="accent1"/>
+              </a:gs>
+            </a:gsLst>
+            <a:lin ang="4800000" scaled="0"/>
+          </a:gradFill>
+          <a:ln>
+            <a:noFill/>
+          </a:ln>
+        </p:spPr>
+        <p:style>
+          <a:lnRef idx="2">
+            <a:schemeClr val="accent1">
+              <a:shade val="50000"/>
+            </a:schemeClr>
+          </a:lnRef>
+          <a:fillRef idx="1">
+            <a:schemeClr val="accent1"/>
+          </a:fillRef>
+          <a:effectRef idx="0">
+            <a:schemeClr val="accent1"/>
+          </a:effectRef>
+          <a:fontRef idx="minor">
+            <a:schemeClr val="lt1"/>
+          </a:fontRef>
+        </p:style>
+        <p:txBody>
+          <a:bodyPr rtlCol="0" anchor="ctr"/>
+          <a:lstStyle/>
+          <a:p>
+            <a:pPr algn="ctr"/>
+            <a:endParaRPr lang="en-US"/>
+          </a:p>
+        </p:txBody>
+      </p:sp>
+      <p:sp>
+        <p:nvSpPr>
+          <p:cNvPr id="15" name="Rectangle 14">
+            <a:extLst>
+              <a:ext uri="{FF2B5EF4-FFF2-40B4-BE49-F238E27FC236}">
+                <a16:creationId xmlns:a16="http://schemas.microsoft.com/office/drawing/2014/main" id="{A8D57A06-A426-446D-B02C-A2DC6B62E45E}"/>
+              </a:ext>
+              <a:ext uri="{C183D7F6-B498-43B3-948B-1728B52AA6E4}">
+                <adec:decorative xmlns:adec="http://schemas.microsoft.com/office/drawing/2017/decorative" val="1"/>
+              </a:ext>
+            </a:extLst>
+          </p:cNvPr>
+          <p:cNvSpPr>
+            <a:spLocks noGrp="1" noRot="1" noChangeAspect="1" noMove="1" noResize="1" noEditPoints="1" noAdjustHandles="1" noChangeArrowheads="1" noChangeShapeType="1" noTextEdit="1"/>
+          </p:cNvSpPr>
+          <p:nvPr>
+            <p:extLst>
+              <p:ext uri="{386F3935-93C4-4BCD-93E2-E3B085C9AB24}">
+                <p16:designElem xmlns:p16="http://schemas.microsoft.com/office/powerpoint/2015/main" val="1"/>
+              </p:ext>
+            </p:extLst>
+          </p:nvPr>
+        </p:nvSpPr>
+        <p:spPr>
+          <a:xfrm rot="16200000" flipH="1">
+            <a:off x="5474237" y="-2528760"/>
+            <a:ext cx="7341846" cy="18290319"/>
+          </a:xfrm>
+          <a:prstGeom prst="rect">
+            <a:avLst/>
+          </a:prstGeom>
+          <a:gradFill>
+            <a:gsLst>
+              <a:gs pos="0">
+                <a:schemeClr val="accent5">
+                  <a:lumMod val="60000"/>
+                  <a:lumOff val="40000"/>
+                  <a:alpha val="0"/>
+                </a:schemeClr>
+              </a:gs>
+              <a:gs pos="100000">
+                <a:srgbClr val="000000">
+                  <a:alpha val="46000"/>
+                </a:srgbClr>
+              </a:gs>
+            </a:gsLst>
+            <a:lin ang="1200000" scaled="0"/>
+          </a:gradFill>
+          <a:ln>
+            <a:noFill/>
+          </a:ln>
+        </p:spPr>
+        <p:style>
+          <a:lnRef idx="2">
+            <a:schemeClr val="accent1">
+              <a:shade val="50000"/>
+            </a:schemeClr>
+          </a:lnRef>
+          <a:fillRef idx="1">
+            <a:schemeClr val="accent1"/>
+          </a:fillRef>
+          <a:effectRef idx="0">
+            <a:schemeClr val="accent1"/>
+          </a:effectRef>
+          <a:fontRef idx="minor">
+            <a:schemeClr val="lt1"/>
+          </a:fontRef>
+        </p:style>
+        <p:txBody>
+          <a:bodyPr rtlCol="0" anchor="ctr"/>
+          <a:lstStyle/>
+          <a:p>
+            <a:pPr algn="ctr"/>
+            <a:endParaRPr lang="en-US"/>
+          </a:p>
+        </p:txBody>
+      </p:sp>
+      <p:grpSp>
+        <p:nvGrpSpPr>
+          <p:cNvPr id="2" name="Group 2"/>
+          <p:cNvGrpSpPr/>
+          <p:nvPr/>
+        </p:nvGrpSpPr>
+        <p:grpSpPr>
+          <a:xfrm>
+            <a:off x="685800" y="2305038"/>
+            <a:ext cx="16916400" cy="5676924"/>
+            <a:chOff x="4622592" y="-633356"/>
+            <a:chExt cx="15849599" cy="5318918"/>
+          </a:xfrm>
+        </p:grpSpPr>
+        <p:sp>
+          <p:nvSpPr>
+            <p:cNvPr id="3" name="TextBox 3"/>
+            <p:cNvSpPr txBox="1"/>
+            <p:nvPr/>
+          </p:nvSpPr>
+          <p:spPr>
+            <a:xfrm>
+              <a:off x="5943392" y="-633356"/>
+              <a:ext cx="14528799" cy="1145613"/>
+            </a:xfrm>
+            <a:prstGeom prst="rect">
+              <a:avLst/>
+            </a:prstGeom>
+          </p:spPr>
+          <p:txBody>
+            <a:bodyPr wrap="square" lIns="0" tIns="0" rIns="0" bIns="0" rtlCol="0" anchor="t">
+              <a:spAutoFit/>
+            </a:bodyPr>
+            <a:lstStyle/>
+            <a:p>
+              <a:pPr defTabSz="1298448">
+                <a:lnSpc>
+                  <a:spcPts val="9541"/>
+                </a:lnSpc>
+                <a:spcAft>
+                  <a:spcPts val="600"/>
+                </a:spcAft>
+              </a:pPr>
+              <a:r>
+                <a:rPr lang="en-US" sz="9087" kern="1200">
+                  <a:solidFill>
+                    <a:srgbClr val="F7B4A7"/>
+                  </a:solidFill>
+                  <a:latin typeface="Clear Sans Bold Bold"/>
+                  <a:ea typeface="+mn-ea"/>
+                  <a:cs typeface="+mn-cs"/>
+                </a:rPr>
+                <a:t>Project objectives</a:t>
+              </a:r>
+              <a:endParaRPr lang="en-US" sz="6399">
+                <a:solidFill>
+                  <a:srgbClr val="F7B4A7"/>
+                </a:solidFill>
+                <a:latin typeface="Clear Sans Bold Bold"/>
+              </a:endParaRPr>
+            </a:p>
+          </p:txBody>
+        </p:sp>
+        <p:sp>
+          <p:nvSpPr>
+            <p:cNvPr id="4" name="TextBox 4"/>
+            <p:cNvSpPr txBox="1"/>
+            <p:nvPr/>
+          </p:nvSpPr>
+          <p:spPr>
+            <a:xfrm>
+              <a:off x="4622592" y="992244"/>
+              <a:ext cx="12293599" cy="3693318"/>
+            </a:xfrm>
+            <a:prstGeom prst="rect">
+              <a:avLst/>
+            </a:prstGeom>
+          </p:spPr>
+          <p:txBody>
+            <a:bodyPr wrap="square" lIns="0" tIns="0" rIns="0" bIns="0" rtlCol="0" anchor="t">
+              <a:spAutoFit/>
+            </a:bodyPr>
+            <a:lstStyle/>
+            <a:p>
+              <a:pPr defTabSz="1298448">
+                <a:spcAft>
+                  <a:spcPts val="600"/>
+                </a:spcAft>
+              </a:pPr>
+              <a:endParaRPr lang="en-US" sz="5112" kern="1200">
+                <a:solidFill>
+                  <a:srgbClr val="94DDDE"/>
+                </a:solidFill>
+                <a:latin typeface="Clear Sans Regular"/>
+                <a:ea typeface="+mn-ea"/>
+                <a:cs typeface="+mn-cs"/>
+              </a:endParaRPr>
+            </a:p>
+            <a:p>
+              <a:pPr defTabSz="1298448">
+                <a:spcAft>
+                  <a:spcPts val="600"/>
+                </a:spcAft>
+              </a:pPr>
+              <a:r>
+                <a:rPr lang="en-US" sz="5112" kern="1200">
+                  <a:solidFill>
+                    <a:srgbClr val="94DDDE"/>
+                  </a:solidFill>
+                  <a:latin typeface="Clear Sans Regular"/>
+                  <a:ea typeface="+mn-ea"/>
+                  <a:cs typeface="+mn-cs"/>
+                </a:rPr>
+                <a:t>To develop an easy access website that enables costumer to visit and show them what to expect and experience on the place and foods offered.</a:t>
+              </a:r>
+              <a:endParaRPr lang="en-US" sz="3600">
+                <a:solidFill>
+                  <a:srgbClr val="94DDDE"/>
+                </a:solidFill>
+                <a:latin typeface="Clear Sans Regular"/>
+              </a:endParaRPr>
+            </a:p>
+          </p:txBody>
+        </p:sp>
+      </p:grpSp>
+    </p:spTree>
+  </p:cSld>
+  <p:clrMapOvr>
+    <a:masterClrMapping/>
+  </p:clrMapOvr>
+</p:sld>
+</file>
+
+<file path=ppt/slides/slide3.xml><?xml version="1.0" encoding="utf-8"?>
+<p:sld xmlns:a="http://schemas.openxmlformats.org/drawingml/2006/main" xmlns:r="http://schemas.openxmlformats.org/officeDocument/2006/relationships" xmlns:p="http://schemas.openxmlformats.org/presentationml/2006/main">
+  <p:cSld>
+    <p:bg>
+      <p:bgPr>
+        <a:solidFill>
           <a:srgbClr val="2B4B82"/>
         </a:solidFill>
         <a:effectLst/>
@@ -4712,7 +5431,7 @@
             <a:off x="1309758" y="1817226"/>
             <a:ext cx="6060519" cy="6652549"/>
             <a:chOff x="0" y="0"/>
-            <a:chExt cx="8080692" cy="8870065"/>
+            <a:chExt cx="8080691" cy="8870065"/>
           </a:xfrm>
         </p:grpSpPr>
         <p:pic>
@@ -5172,7 +5891,7 @@
 </p:sld>
 </file>
 
-<file path=ppt/slides/slide3.xml><?xml version="1.0" encoding="utf-8"?>
+<file path=ppt/slides/slide4.xml><?xml version="1.0" encoding="utf-8"?>
 <p:sld xmlns:a="http://schemas.openxmlformats.org/drawingml/2006/main" xmlns:r="http://schemas.openxmlformats.org/officeDocument/2006/relationships" xmlns:p="http://schemas.openxmlformats.org/presentationml/2006/main">
   <p:cSld>
     <p:bg>
@@ -5413,7 +6132,532 @@
 </p:sld>
 </file>
 
-<file path=ppt/slides/slide4.xml><?xml version="1.0" encoding="utf-8"?>
+<file path=ppt/slides/slide5.xml><?xml version="1.0" encoding="utf-8"?>
+<p:sld xmlns:a="http://schemas.openxmlformats.org/drawingml/2006/main" xmlns:r="http://schemas.openxmlformats.org/officeDocument/2006/relationships" xmlns:p="http://schemas.openxmlformats.org/presentationml/2006/main">
+  <p:cSld>
+    <p:bg>
+      <p:bgPr>
+        <a:solidFill>
+          <a:schemeClr val="bg1"/>
+        </a:solidFill>
+        <a:effectLst/>
+      </p:bgPr>
+    </p:bg>
+    <p:spTree>
+      <p:nvGrpSpPr>
+        <p:cNvPr id="1" name=""/>
+        <p:cNvGrpSpPr/>
+        <p:nvPr/>
+      </p:nvGrpSpPr>
+      <p:grpSpPr>
+        <a:xfrm>
+          <a:off x="0" y="0"/>
+          <a:ext cx="0" cy="0"/>
+          <a:chOff x="0" y="0"/>
+          <a:chExt cx="0" cy="0"/>
+        </a:xfrm>
+      </p:grpSpPr>
+      <p:sp useBgFill="1">
+        <p:nvSpPr>
+          <p:cNvPr id="11" name="Rectangle 10">
+            <a:extLst>
+              <a:ext uri="{FF2B5EF4-FFF2-40B4-BE49-F238E27FC236}">
+                <a16:creationId xmlns:a16="http://schemas.microsoft.com/office/drawing/2014/main" id="{AB8C311F-7253-4AED-9701-7FC0708C41C7}"/>
+              </a:ext>
+              <a:ext uri="{C183D7F6-B498-43B3-948B-1728B52AA6E4}">
+                <adec:decorative xmlns:adec="http://schemas.microsoft.com/office/drawing/2017/decorative" val="1"/>
+              </a:ext>
+            </a:extLst>
+          </p:cNvPr>
+          <p:cNvSpPr>
+            <a:spLocks noGrp="1" noRot="1" noChangeAspect="1" noMove="1" noResize="1" noEditPoints="1" noAdjustHandles="1" noChangeArrowheads="1" noChangeShapeType="1" noTextEdit="1"/>
+          </p:cNvSpPr>
+          <p:nvPr>
+            <p:extLst>
+              <p:ext uri="{386F3935-93C4-4BCD-93E2-E3B085C9AB24}">
+                <p16:designElem xmlns:p16="http://schemas.microsoft.com/office/powerpoint/2015/main" val="1"/>
+              </p:ext>
+            </p:extLst>
+          </p:nvPr>
+        </p:nvSpPr>
+        <p:spPr>
+          <a:xfrm>
+            <a:off x="0" y="0"/>
+            <a:ext cx="18288000" cy="10287000"/>
+          </a:xfrm>
+          <a:prstGeom prst="rect">
+            <a:avLst/>
+          </a:prstGeom>
+          <a:ln w="12700" cap="flat" cmpd="sng" algn="ctr">
+            <a:noFill/>
+            <a:prstDash val="solid"/>
+            <a:miter lim="800000"/>
+          </a:ln>
+          <a:effectLst/>
+          <a:extLst>
+            <a:ext uri="{91240B29-F687-4F45-9708-019B960494DF}">
+              <a14:hiddenLine xmlns:a14="http://schemas.microsoft.com/office/drawing/2010/main" w="12700" cap="flat" cmpd="sng" algn="ctr">
+                <a:solidFill>
+                  <a:schemeClr val="accent1">
+                    <a:shade val="50000"/>
+                  </a:schemeClr>
+                </a:solidFill>
+                <a:prstDash val="solid"/>
+                <a:miter lim="800000"/>
+              </a14:hiddenLine>
+            </a:ext>
+          </a:extLst>
+        </p:spPr>
+        <p:style>
+          <a:lnRef idx="2">
+            <a:schemeClr val="accent1">
+              <a:shade val="50000"/>
+            </a:schemeClr>
+          </a:lnRef>
+          <a:fillRef idx="1">
+            <a:schemeClr val="accent1"/>
+          </a:fillRef>
+          <a:effectRef idx="0">
+            <a:schemeClr val="accent1"/>
+          </a:effectRef>
+          <a:fontRef idx="minor">
+            <a:schemeClr val="lt1"/>
+          </a:fontRef>
+        </p:style>
+        <p:txBody>
+          <a:bodyPr rtlCol="0" anchor="ctr"/>
+          <a:lstStyle/>
+          <a:p>
+            <a:pPr algn="ctr"/>
+            <a:endParaRPr lang="en-US"/>
+          </a:p>
+        </p:txBody>
+      </p:sp>
+      <p:sp>
+        <p:nvSpPr>
+          <p:cNvPr id="13" name="Rectangle 12">
+            <a:extLst>
+              <a:ext uri="{FF2B5EF4-FFF2-40B4-BE49-F238E27FC236}">
+                <a16:creationId xmlns:a16="http://schemas.microsoft.com/office/drawing/2014/main" id="{E2384209-CB15-4CDF-9D31-C44FD9A3F20D}"/>
+              </a:ext>
+              <a:ext uri="{C183D7F6-B498-43B3-948B-1728B52AA6E4}">
+                <adec:decorative xmlns:adec="http://schemas.microsoft.com/office/drawing/2017/decorative" val="1"/>
+              </a:ext>
+            </a:extLst>
+          </p:cNvPr>
+          <p:cNvSpPr>
+            <a:spLocks noGrp="1" noRot="1" noChangeAspect="1" noMove="1" noResize="1" noEditPoints="1" noAdjustHandles="1" noChangeArrowheads="1" noChangeShapeType="1" noTextEdit="1"/>
+          </p:cNvSpPr>
+          <p:nvPr>
+            <p:extLst>
+              <p:ext uri="{386F3935-93C4-4BCD-93E2-E3B085C9AB24}">
+                <p16:designElem xmlns:p16="http://schemas.microsoft.com/office/powerpoint/2015/main" val="1"/>
+              </p:ext>
+            </p:extLst>
+          </p:nvPr>
+        </p:nvSpPr>
+        <p:spPr>
+          <a:xfrm rot="16200000" flipH="1">
+            <a:off x="3999926" y="-3999282"/>
+            <a:ext cx="10287000" cy="18286850"/>
+          </a:xfrm>
+          <a:prstGeom prst="rect">
+            <a:avLst/>
+          </a:prstGeom>
+          <a:gradFill>
+            <a:gsLst>
+              <a:gs pos="8000">
+                <a:schemeClr val="accent1"/>
+              </a:gs>
+              <a:gs pos="100000">
+                <a:schemeClr val="accent1">
+                  <a:lumMod val="50000"/>
+                </a:schemeClr>
+              </a:gs>
+            </a:gsLst>
+            <a:lin ang="12000000" scaled="0"/>
+          </a:gradFill>
+          <a:ln>
+            <a:noFill/>
+          </a:ln>
+        </p:spPr>
+        <p:style>
+          <a:lnRef idx="2">
+            <a:schemeClr val="accent1">
+              <a:shade val="50000"/>
+            </a:schemeClr>
+          </a:lnRef>
+          <a:fillRef idx="1">
+            <a:schemeClr val="accent1"/>
+          </a:fillRef>
+          <a:effectRef idx="0">
+            <a:schemeClr val="accent1"/>
+          </a:effectRef>
+          <a:fontRef idx="minor">
+            <a:schemeClr val="lt1"/>
+          </a:fontRef>
+        </p:style>
+        <p:txBody>
+          <a:bodyPr rtlCol="0" anchor="ctr"/>
+          <a:lstStyle/>
+          <a:p>
+            <a:pPr algn="ctr"/>
+            <a:endParaRPr lang="en-US"/>
+          </a:p>
+        </p:txBody>
+      </p:sp>
+      <p:sp>
+        <p:nvSpPr>
+          <p:cNvPr id="15" name="Rectangle 14">
+            <a:extLst>
+              <a:ext uri="{FF2B5EF4-FFF2-40B4-BE49-F238E27FC236}">
+                <a16:creationId xmlns:a16="http://schemas.microsoft.com/office/drawing/2014/main" id="{2633B3B5-CC90-43F0-8714-D31D1F3F0209}"/>
+              </a:ext>
+              <a:ext uri="{C183D7F6-B498-43B3-948B-1728B52AA6E4}">
+                <adec:decorative xmlns:adec="http://schemas.microsoft.com/office/drawing/2017/decorative" val="1"/>
+              </a:ext>
+            </a:extLst>
+          </p:cNvPr>
+          <p:cNvSpPr>
+            <a:spLocks noGrp="1" noRot="1" noChangeAspect="1" noMove="1" noResize="1" noEditPoints="1" noAdjustHandles="1" noChangeArrowheads="1" noChangeShapeType="1" noTextEdit="1"/>
+          </p:cNvSpPr>
+          <p:nvPr>
+            <p:extLst>
+              <p:ext uri="{386F3935-93C4-4BCD-93E2-E3B085C9AB24}">
+                <p16:designElem xmlns:p16="http://schemas.microsoft.com/office/powerpoint/2015/main" val="1"/>
+              </p:ext>
+            </p:extLst>
+          </p:nvPr>
+        </p:nvSpPr>
+        <p:spPr>
+          <a:xfrm rot="10800000" flipH="1">
+            <a:off x="-3466" y="0"/>
+            <a:ext cx="13606268" cy="10286358"/>
+          </a:xfrm>
+          <a:prstGeom prst="rect">
+            <a:avLst/>
+          </a:prstGeom>
+          <a:gradFill>
+            <a:gsLst>
+              <a:gs pos="8000">
+                <a:srgbClr val="000000">
+                  <a:alpha val="52000"/>
+                </a:srgbClr>
+              </a:gs>
+              <a:gs pos="100000">
+                <a:schemeClr val="accent1"/>
+              </a:gs>
+            </a:gsLst>
+            <a:lin ang="4800000" scaled="0"/>
+          </a:gradFill>
+          <a:ln>
+            <a:noFill/>
+          </a:ln>
+        </p:spPr>
+        <p:style>
+          <a:lnRef idx="2">
+            <a:schemeClr val="accent1">
+              <a:shade val="50000"/>
+            </a:schemeClr>
+          </a:lnRef>
+          <a:fillRef idx="1">
+            <a:schemeClr val="accent1"/>
+          </a:fillRef>
+          <a:effectRef idx="0">
+            <a:schemeClr val="accent1"/>
+          </a:effectRef>
+          <a:fontRef idx="minor">
+            <a:schemeClr val="lt1"/>
+          </a:fontRef>
+        </p:style>
+        <p:txBody>
+          <a:bodyPr rtlCol="0" anchor="ctr"/>
+          <a:lstStyle/>
+          <a:p>
+            <a:pPr algn="ctr"/>
+            <a:endParaRPr lang="en-US"/>
+          </a:p>
+        </p:txBody>
+      </p:sp>
+      <p:sp>
+        <p:nvSpPr>
+          <p:cNvPr id="17" name="Rectangle 16">
+            <a:extLst>
+              <a:ext uri="{FF2B5EF4-FFF2-40B4-BE49-F238E27FC236}">
+                <a16:creationId xmlns:a16="http://schemas.microsoft.com/office/drawing/2014/main" id="{A8D57A06-A426-446D-B02C-A2DC6B62E45E}"/>
+              </a:ext>
+              <a:ext uri="{C183D7F6-B498-43B3-948B-1728B52AA6E4}">
+                <adec:decorative xmlns:adec="http://schemas.microsoft.com/office/drawing/2017/decorative" val="1"/>
+              </a:ext>
+            </a:extLst>
+          </p:cNvPr>
+          <p:cNvSpPr>
+            <a:spLocks noGrp="1" noRot="1" noChangeAspect="1" noMove="1" noResize="1" noEditPoints="1" noAdjustHandles="1" noChangeArrowheads="1" noChangeShapeType="1" noTextEdit="1"/>
+          </p:cNvSpPr>
+          <p:nvPr>
+            <p:extLst>
+              <p:ext uri="{386F3935-93C4-4BCD-93E2-E3B085C9AB24}">
+                <p16:designElem xmlns:p16="http://schemas.microsoft.com/office/powerpoint/2015/main" val="1"/>
+              </p:ext>
+            </p:extLst>
+          </p:nvPr>
+        </p:nvSpPr>
+        <p:spPr>
+          <a:xfrm rot="16200000" flipH="1">
+            <a:off x="5474237" y="-2528760"/>
+            <a:ext cx="7341846" cy="18290319"/>
+          </a:xfrm>
+          <a:prstGeom prst="rect">
+            <a:avLst/>
+          </a:prstGeom>
+          <a:gradFill>
+            <a:gsLst>
+              <a:gs pos="0">
+                <a:schemeClr val="accent5">
+                  <a:lumMod val="60000"/>
+                  <a:lumOff val="40000"/>
+                  <a:alpha val="0"/>
+                </a:schemeClr>
+              </a:gs>
+              <a:gs pos="100000">
+                <a:srgbClr val="000000">
+                  <a:alpha val="46000"/>
+                </a:srgbClr>
+              </a:gs>
+            </a:gsLst>
+            <a:lin ang="1200000" scaled="0"/>
+          </a:gradFill>
+          <a:ln>
+            <a:noFill/>
+          </a:ln>
+        </p:spPr>
+        <p:style>
+          <a:lnRef idx="2">
+            <a:schemeClr val="accent1">
+              <a:shade val="50000"/>
+            </a:schemeClr>
+          </a:lnRef>
+          <a:fillRef idx="1">
+            <a:schemeClr val="accent1"/>
+          </a:fillRef>
+          <a:effectRef idx="0">
+            <a:schemeClr val="accent1"/>
+          </a:effectRef>
+          <a:fontRef idx="minor">
+            <a:schemeClr val="lt1"/>
+          </a:fontRef>
+        </p:style>
+        <p:txBody>
+          <a:bodyPr rtlCol="0" anchor="ctr"/>
+          <a:lstStyle/>
+          <a:p>
+            <a:pPr algn="ctr"/>
+            <a:endParaRPr lang="en-US"/>
+          </a:p>
+        </p:txBody>
+      </p:sp>
+      <p:pic>
+        <p:nvPicPr>
+          <p:cNvPr id="2" name="Picture 2"/>
+          <p:cNvPicPr>
+            <a:picLocks noChangeAspect="1"/>
+          </p:cNvPicPr>
+          <p:nvPr/>
+        </p:nvPicPr>
+        <p:blipFill>
+          <a:blip r:embed="rId2">
+            <a:extLst>
+              <a:ext uri="{28A0092B-C50C-407E-A947-70E740481C1C}">
+                <a14:useLocalDpi xmlns:a14="http://schemas.microsoft.com/office/drawing/2010/main" val="0"/>
+              </a:ext>
+              <a:ext uri="{96DAC541-7B7A-43D3-8B79-37D633B846F1}">
+                <asvg:svgBlip xmlns:asvg="http://schemas.microsoft.com/office/drawing/2016/SVG/main" r:embed="rId3"/>
+              </a:ext>
+            </a:extLst>
+          </a:blip>
+          <a:srcRect/>
+          <a:stretch>
+            <a:fillRect/>
+          </a:stretch>
+        </p:blipFill>
+        <p:spPr>
+          <a:xfrm>
+            <a:off x="10409325" y="1520715"/>
+            <a:ext cx="7192875" cy="7245570"/>
+          </a:xfrm>
+          <a:prstGeom prst="rect">
+            <a:avLst/>
+          </a:prstGeom>
+        </p:spPr>
+      </p:pic>
+      <p:sp>
+        <p:nvSpPr>
+          <p:cNvPr id="3" name="TextBox 3"/>
+          <p:cNvSpPr txBox="1"/>
+          <p:nvPr/>
+        </p:nvSpPr>
+        <p:spPr>
+          <a:xfrm>
+            <a:off x="685800" y="3057256"/>
+            <a:ext cx="8248297" cy="2794269"/>
+          </a:xfrm>
+          <a:prstGeom prst="rect">
+            <a:avLst/>
+          </a:prstGeom>
+        </p:spPr>
+        <p:txBody>
+          <a:bodyPr lIns="0" tIns="0" rIns="0" bIns="0" rtlCol="0" anchor="t">
+            <a:spAutoFit/>
+          </a:bodyPr>
+          <a:lstStyle/>
+          <a:p>
+            <a:pPr defTabSz="1033272">
+              <a:lnSpc>
+                <a:spcPts val="10848"/>
+              </a:lnSpc>
+              <a:spcAft>
+                <a:spcPts val="600"/>
+              </a:spcAft>
+            </a:pPr>
+            <a:r>
+              <a:rPr lang="en-US" sz="9040" kern="1200">
+                <a:solidFill>
+                  <a:srgbClr val="F7B4A7"/>
+                </a:solidFill>
+                <a:latin typeface="Clear Sans Bold Bold"/>
+                <a:ea typeface="+mn-ea"/>
+                <a:cs typeface="+mn-cs"/>
+              </a:rPr>
+              <a:t>Target Audience:</a:t>
+            </a:r>
+            <a:endParaRPr lang="en-US" sz="8000">
+              <a:solidFill>
+                <a:srgbClr val="F7B4A7"/>
+              </a:solidFill>
+              <a:latin typeface="Clear Sans Bold Bold"/>
+            </a:endParaRPr>
+          </a:p>
+        </p:txBody>
+      </p:sp>
+      <p:sp>
+        <p:nvSpPr>
+          <p:cNvPr id="4" name="TextBox 4">
+            <a:extLst>
+              <a:ext uri="{FF2B5EF4-FFF2-40B4-BE49-F238E27FC236}">
+                <a16:creationId xmlns:a16="http://schemas.microsoft.com/office/drawing/2014/main" id="{FEF17D7A-09E4-3DC2-F13D-00475A96C9AB}"/>
+              </a:ext>
+            </a:extLst>
+          </p:cNvPr>
+          <p:cNvSpPr txBox="1"/>
+          <p:nvPr/>
+        </p:nvSpPr>
+        <p:spPr>
+          <a:xfrm>
+            <a:off x="708359" y="6959504"/>
+            <a:ext cx="7242511" cy="548765"/>
+          </a:xfrm>
+          <a:prstGeom prst="rect">
+            <a:avLst/>
+          </a:prstGeom>
+        </p:spPr>
+        <p:txBody>
+          <a:bodyPr lIns="0" tIns="0" rIns="0" bIns="0" rtlCol="0" anchor="t">
+            <a:spAutoFit/>
+          </a:bodyPr>
+          <a:lstStyle/>
+          <a:p>
+            <a:pPr defTabSz="1033272">
+              <a:lnSpc>
+                <a:spcPts val="4588"/>
+              </a:lnSpc>
+              <a:spcAft>
+                <a:spcPts val="600"/>
+              </a:spcAft>
+            </a:pPr>
+            <a:r>
+              <a:rPr lang="en-US" sz="3277" kern="1200">
+                <a:solidFill>
+                  <a:srgbClr val="94DDDE"/>
+                </a:solidFill>
+                <a:latin typeface="Clear Sans Regular"/>
+                <a:ea typeface="+mn-ea"/>
+                <a:cs typeface="+mn-cs"/>
+              </a:rPr>
+              <a:t>All gender</a:t>
+            </a:r>
+            <a:endParaRPr lang="en-US" sz="2900">
+              <a:solidFill>
+                <a:srgbClr val="94DDDE"/>
+              </a:solidFill>
+              <a:latin typeface="Clear Sans Regular"/>
+            </a:endParaRPr>
+          </a:p>
+        </p:txBody>
+      </p:sp>
+      <p:sp>
+        <p:nvSpPr>
+          <p:cNvPr id="5" name="TextBox 4">
+            <a:extLst>
+              <a:ext uri="{FF2B5EF4-FFF2-40B4-BE49-F238E27FC236}">
+                <a16:creationId xmlns:a16="http://schemas.microsoft.com/office/drawing/2014/main" id="{3A29F2CD-BD7B-77B1-9E40-A298C90AC65B}"/>
+              </a:ext>
+            </a:extLst>
+          </p:cNvPr>
+          <p:cNvSpPr txBox="1"/>
+          <p:nvPr/>
+        </p:nvSpPr>
+        <p:spPr>
+          <a:xfrm>
+            <a:off x="712119" y="7737791"/>
+            <a:ext cx="7242511" cy="548765"/>
+          </a:xfrm>
+          <a:prstGeom prst="rect">
+            <a:avLst/>
+          </a:prstGeom>
+        </p:spPr>
+        <p:txBody>
+          <a:bodyPr lIns="0" tIns="0" rIns="0" bIns="0" rtlCol="0" anchor="t">
+            <a:spAutoFit/>
+          </a:bodyPr>
+          <a:lstStyle/>
+          <a:p>
+            <a:pPr defTabSz="1033272">
+              <a:lnSpc>
+                <a:spcPts val="4588"/>
+              </a:lnSpc>
+              <a:spcAft>
+                <a:spcPts val="600"/>
+              </a:spcAft>
+            </a:pPr>
+            <a:r>
+              <a:rPr lang="en-US" sz="3277" kern="1200">
+                <a:solidFill>
+                  <a:srgbClr val="94DDDE"/>
+                </a:solidFill>
+                <a:latin typeface="Clear Sans Regular"/>
+                <a:ea typeface="+mn-ea"/>
+                <a:cs typeface="+mn-cs"/>
+              </a:rPr>
+              <a:t>Resident in Leyte</a:t>
+            </a:r>
+            <a:endParaRPr lang="en-US" sz="2900">
+              <a:solidFill>
+                <a:srgbClr val="94DDDE"/>
+              </a:solidFill>
+              <a:latin typeface="Clear Sans Regular"/>
+            </a:endParaRPr>
+          </a:p>
+        </p:txBody>
+      </p:sp>
+    </p:spTree>
+  </p:cSld>
+  <p:clrMapOvr>
+    <a:masterClrMapping/>
+  </p:clrMapOvr>
+</p:sld>
+</file>
+
+<file path=ppt/slides/slide6.xml><?xml version="1.0" encoding="utf-8"?>
 <p:sld xmlns:a="http://schemas.openxmlformats.org/drawingml/2006/main" xmlns:r="http://schemas.openxmlformats.org/officeDocument/2006/relationships" xmlns:p="http://schemas.openxmlformats.org/presentationml/2006/main">
   <p:cSld>
     <p:bg>
@@ -6242,56 +7486,7 @@
         </p:nvSpPr>
         <p:spPr>
           <a:xfrm>
-            <a:off x="12624829" y="7464209"/>
-            <a:ext cx="1519727" cy="840071"/>
-          </a:xfrm>
-          <a:prstGeom prst="roundRect">
-            <a:avLst/>
-          </a:prstGeom>
-        </p:spPr>
-        <p:style>
-          <a:lnRef idx="2">
-            <a:schemeClr val="accent1">
-              <a:shade val="50000"/>
-            </a:schemeClr>
-          </a:lnRef>
-          <a:fillRef idx="1">
-            <a:schemeClr val="accent1"/>
-          </a:fillRef>
-          <a:effectRef idx="0">
-            <a:schemeClr val="accent1"/>
-          </a:effectRef>
-          <a:fontRef idx="minor">
-            <a:schemeClr val="lt1"/>
-          </a:fontRef>
-        </p:style>
-        <p:txBody>
-          <a:bodyPr rtlCol="0" anchor="ctr"/>
-          <a:lstStyle/>
-          <a:p>
-            <a:pPr algn="ctr"/>
-            <a:r>
-              <a:rPr lang="en-US" sz="2500" dirty="0"/>
-              <a:t>Get in touch</a:t>
-            </a:r>
-          </a:p>
-        </p:txBody>
-      </p:sp>
-      <p:sp>
-        <p:nvSpPr>
-          <p:cNvPr id="51" name="Rectangle: Rounded Corners 50">
-            <a:extLst>
-              <a:ext uri="{FF2B5EF4-FFF2-40B4-BE49-F238E27FC236}">
-                <a16:creationId xmlns:a16="http://schemas.microsoft.com/office/drawing/2014/main" id="{E0E1D2A0-A07B-4AE3-233A-A17E075DAA5C}"/>
-              </a:ext>
-            </a:extLst>
-          </p:cNvPr>
-          <p:cNvSpPr/>
-          <p:nvPr/>
-        </p:nvSpPr>
-        <p:spPr>
-          <a:xfrm>
-            <a:off x="9734686" y="6309468"/>
+            <a:off x="9679536" y="6283492"/>
             <a:ext cx="1519727" cy="343640"/>
           </a:xfrm>
           <a:prstGeom prst="roundRect">
@@ -6320,9 +7515,10 @@
           <a:p>
             <a:pPr algn="ctr"/>
             <a:r>
-              <a:rPr lang="en-US" sz="2500" dirty="0"/>
-              <a:t>Image </a:t>
+              <a:rPr lang="en-US" sz="2500"/>
+              <a:t>Images</a:t>
             </a:r>
+            <a:endParaRPr lang="en-US" sz="2500" dirty="0"/>
           </a:p>
         </p:txBody>
       </p:sp>
@@ -6377,10 +7573,10 @@
       </p:sp>
       <p:sp>
         <p:nvSpPr>
-          <p:cNvPr id="53" name="Rectangle: Rounded Corners 52">
+          <p:cNvPr id="54" name="Rectangle: Rounded Corners 53">
             <a:extLst>
               <a:ext uri="{FF2B5EF4-FFF2-40B4-BE49-F238E27FC236}">
-                <a16:creationId xmlns:a16="http://schemas.microsoft.com/office/drawing/2014/main" id="{F7F71B56-2CF2-9D6F-8A03-70FC734E31A8}"/>
+                <a16:creationId xmlns:a16="http://schemas.microsoft.com/office/drawing/2014/main" id="{7578D4AF-6561-BEE0-E7DE-A3E6041C5A48}"/>
               </a:ext>
             </a:extLst>
           </p:cNvPr>
@@ -6389,7 +7585,7 @@
         </p:nvSpPr>
         <p:spPr>
           <a:xfrm>
-            <a:off x="6972574" y="7989206"/>
+            <a:off x="6972573" y="7989206"/>
             <a:ext cx="1519727" cy="343640"/>
           </a:xfrm>
           <a:prstGeom prst="roundRect">
@@ -6419,17 +7615,17 @@
             <a:pPr algn="ctr"/>
             <a:r>
               <a:rPr lang="en-US" sz="2500" dirty="0"/>
-              <a:t>Beef</a:t>
+              <a:t>Sides</a:t>
             </a:r>
           </a:p>
         </p:txBody>
       </p:sp>
       <p:sp>
         <p:nvSpPr>
-          <p:cNvPr id="54" name="Rectangle: Rounded Corners 53">
+          <p:cNvPr id="57" name="Rectangle: Rounded Corners 56">
             <a:extLst>
               <a:ext uri="{FF2B5EF4-FFF2-40B4-BE49-F238E27FC236}">
-                <a16:creationId xmlns:a16="http://schemas.microsoft.com/office/drawing/2014/main" id="{7578D4AF-6561-BEE0-E7DE-A3E6041C5A48}"/>
+                <a16:creationId xmlns:a16="http://schemas.microsoft.com/office/drawing/2014/main" id="{343C141B-A114-69AC-C210-5B580869B0F4}"/>
               </a:ext>
             </a:extLst>
           </p:cNvPr>
@@ -6438,8 +7634,8 @@
         </p:nvSpPr>
         <p:spPr>
           <a:xfrm>
-            <a:off x="6948416" y="8735786"/>
-            <a:ext cx="1519727" cy="343640"/>
+            <a:off x="12088817" y="7221058"/>
+            <a:ext cx="2391306" cy="343640"/>
           </a:xfrm>
           <a:prstGeom prst="roundRect">
             <a:avLst/>
@@ -6468,7 +7664,7 @@
             <a:pPr algn="ctr"/>
             <a:r>
               <a:rPr lang="en-US" sz="2500" dirty="0"/>
-              <a:t>Sides</a:t>
+              <a:t>Get in touch</a:t>
             </a:r>
           </a:p>
         </p:txBody>
@@ -6835,6 +8031,47 @@
       </p:cxnSp>
       <p:cxnSp>
         <p:nvCxnSpPr>
+          <p:cNvPr id="79" name="Straight Arrow Connector 78">
+            <a:extLst>
+              <a:ext uri="{FF2B5EF4-FFF2-40B4-BE49-F238E27FC236}">
+                <a16:creationId xmlns:a16="http://schemas.microsoft.com/office/drawing/2014/main" id="{99070B85-4DF7-DE9B-7D21-1AD4AA0FB75B}"/>
+              </a:ext>
+            </a:extLst>
+          </p:cNvPr>
+          <p:cNvCxnSpPr>
+            <a:cxnSpLocks/>
+          </p:cNvCxnSpPr>
+          <p:nvPr/>
+        </p:nvCxnSpPr>
+        <p:spPr>
+          <a:xfrm>
+            <a:off x="5562600" y="5537669"/>
+            <a:ext cx="0" cy="610867"/>
+          </a:xfrm>
+          <a:prstGeom prst="straightConnector1">
+            <a:avLst/>
+          </a:prstGeom>
+          <a:ln>
+            <a:tailEnd type="triangle"/>
+          </a:ln>
+        </p:spPr>
+        <p:style>
+          <a:lnRef idx="1">
+            <a:schemeClr val="accent1"/>
+          </a:lnRef>
+          <a:fillRef idx="0">
+            <a:schemeClr val="accent1"/>
+          </a:fillRef>
+          <a:effectRef idx="0">
+            <a:schemeClr val="accent1"/>
+          </a:effectRef>
+          <a:fontRef idx="minor">
+            <a:schemeClr val="tx1"/>
+          </a:fontRef>
+        </p:style>
+      </p:cxnSp>
+      <p:cxnSp>
+        <p:nvCxnSpPr>
           <p:cNvPr id="106" name="Straight Arrow Connector 105">
             <a:extLst>
               <a:ext uri="{FF2B5EF4-FFF2-40B4-BE49-F238E27FC236}">
@@ -6929,7 +8166,7 @@
         </p:nvSpPr>
         <p:spPr>
           <a:xfrm>
-            <a:off x="6933989" y="9541901"/>
+            <a:off x="6958146" y="8795321"/>
             <a:ext cx="1598064" cy="343640"/>
           </a:xfrm>
           <a:prstGeom prst="roundRect">
@@ -6978,7 +8215,7 @@
         </p:nvCxnSpPr>
         <p:spPr>
           <a:xfrm>
-            <a:off x="7693854" y="8319670"/>
+            <a:off x="7774330" y="6689820"/>
             <a:ext cx="0" cy="402940"/>
           </a:xfrm>
           <a:prstGeom prst="straightConnector1">
@@ -7017,7 +8254,7 @@
         </p:nvCxnSpPr>
         <p:spPr>
           <a:xfrm>
-            <a:off x="7693854" y="9081670"/>
+            <a:off x="7864216" y="8332846"/>
             <a:ext cx="0" cy="462475"/>
           </a:xfrm>
           <a:prstGeom prst="straightConnector1">
@@ -7042,9 +8279,50 @@
           </a:fontRef>
         </p:style>
       </p:cxnSp>
+      <p:cxnSp>
+        <p:nvCxnSpPr>
+          <p:cNvPr id="3" name="Straight Arrow Connector 2">
+            <a:extLst>
+              <a:ext uri="{FF2B5EF4-FFF2-40B4-BE49-F238E27FC236}">
+                <a16:creationId xmlns:a16="http://schemas.microsoft.com/office/drawing/2014/main" id="{74C15BB9-1399-9FBA-AD5E-953E7A41193C}"/>
+              </a:ext>
+            </a:extLst>
+          </p:cNvPr>
+          <p:cNvCxnSpPr>
+            <a:cxnSpLocks/>
+          </p:cNvCxnSpPr>
+          <p:nvPr/>
+        </p:nvCxnSpPr>
+        <p:spPr>
+          <a:xfrm>
+            <a:off x="5562600" y="6944872"/>
+            <a:ext cx="0" cy="768158"/>
+          </a:xfrm>
+          <a:prstGeom prst="straightConnector1">
+            <a:avLst/>
+          </a:prstGeom>
+          <a:ln>
+            <a:tailEnd type="triangle"/>
+          </a:ln>
+        </p:spPr>
+        <p:style>
+          <a:lnRef idx="1">
+            <a:schemeClr val="accent1"/>
+          </a:lnRef>
+          <a:fillRef idx="0">
+            <a:schemeClr val="accent1"/>
+          </a:fillRef>
+          <a:effectRef idx="0">
+            <a:schemeClr val="accent1"/>
+          </a:effectRef>
+          <a:fontRef idx="minor">
+            <a:schemeClr val="tx1"/>
+          </a:fontRef>
+        </p:style>
+      </p:cxnSp>
       <p:sp>
         <p:nvSpPr>
-          <p:cNvPr id="3" name="Rectangle: Rounded Corners 2">
+          <p:cNvPr id="22" name="Rectangle: Rounded Corners 2">
             <a:extLst>
               <a:ext uri="{FF2B5EF4-FFF2-40B4-BE49-F238E27FC236}">
                 <a16:creationId xmlns:a16="http://schemas.microsoft.com/office/drawing/2014/main" id="{C762F320-FA41-2D62-FB27-DF91BFD9A517}"/>
@@ -7093,7 +8371,7 @@
       </p:sp>
       <p:cxnSp>
         <p:nvCxnSpPr>
-          <p:cNvPr id="13" name="Straight Arrow Connector 12">
+          <p:cNvPr id="23" name="Straight Arrow Connector 12">
             <a:extLst>
               <a:ext uri="{FF2B5EF4-FFF2-40B4-BE49-F238E27FC236}">
                 <a16:creationId xmlns:a16="http://schemas.microsoft.com/office/drawing/2014/main" id="{D9126CEC-51A3-00F5-C0B7-0DE5C6F43E03}"/>
@@ -7410,7 +8688,7 @@
 </p:sld>
 </file>
 
-<file path=ppt/slides/slide5.xml><?xml version="1.0" encoding="utf-8"?>
+<file path=ppt/slides/slide7.xml><?xml version="1.0" encoding="utf-8"?>
 <p:sld xmlns:a="http://schemas.openxmlformats.org/drawingml/2006/main" xmlns:r="http://schemas.openxmlformats.org/officeDocument/2006/relationships" xmlns:p="http://schemas.openxmlformats.org/presentationml/2006/main">
   <p:cSld>
     <p:bg>
@@ -7990,988 +9268,6 @@
           </a:prstGeom>
         </p:spPr>
       </p:pic>
-    </p:spTree>
-  </p:cSld>
-  <p:clrMapOvr>
-    <a:masterClrMapping/>
-  </p:clrMapOvr>
-</p:sld>
-</file>
-
-<file path=ppt/slides/slide6.xml><?xml version="1.0" encoding="utf-8"?>
-<p:sld xmlns:a="http://schemas.openxmlformats.org/drawingml/2006/main" xmlns:r="http://schemas.openxmlformats.org/officeDocument/2006/relationships" xmlns:p="http://schemas.openxmlformats.org/presentationml/2006/main">
-  <p:cSld>
-    <p:bg>
-      <p:bgPr>
-        <a:solidFill>
-          <a:schemeClr val="bg1"/>
-        </a:solidFill>
-        <a:effectLst/>
-      </p:bgPr>
-    </p:bg>
-    <p:spTree>
-      <p:nvGrpSpPr>
-        <p:cNvPr id="1" name=""/>
-        <p:cNvGrpSpPr/>
-        <p:nvPr/>
-      </p:nvGrpSpPr>
-      <p:grpSpPr>
-        <a:xfrm>
-          <a:off x="0" y="0"/>
-          <a:ext cx="0" cy="0"/>
-          <a:chOff x="0" y="0"/>
-          <a:chExt cx="0" cy="0"/>
-        </a:xfrm>
-      </p:grpSpPr>
-      <p:sp useBgFill="1">
-        <p:nvSpPr>
-          <p:cNvPr id="9" name="Rectangle 8">
-            <a:extLst>
-              <a:ext uri="{FF2B5EF4-FFF2-40B4-BE49-F238E27FC236}">
-                <a16:creationId xmlns:a16="http://schemas.microsoft.com/office/drawing/2014/main" id="{AB8C311F-7253-4AED-9701-7FC0708C41C7}"/>
-              </a:ext>
-              <a:ext uri="{C183D7F6-B498-43B3-948B-1728B52AA6E4}">
-                <adec:decorative xmlns:adec="http://schemas.microsoft.com/office/drawing/2017/decorative" val="1"/>
-              </a:ext>
-            </a:extLst>
-          </p:cNvPr>
-          <p:cNvSpPr>
-            <a:spLocks noGrp="1" noRot="1" noChangeAspect="1" noMove="1" noResize="1" noEditPoints="1" noAdjustHandles="1" noChangeArrowheads="1" noChangeShapeType="1" noTextEdit="1"/>
-          </p:cNvSpPr>
-          <p:nvPr>
-            <p:extLst>
-              <p:ext uri="{386F3935-93C4-4BCD-93E2-E3B085C9AB24}">
-                <p16:designElem xmlns:p16="http://schemas.microsoft.com/office/powerpoint/2015/main" val="1"/>
-              </p:ext>
-            </p:extLst>
-          </p:nvPr>
-        </p:nvSpPr>
-        <p:spPr>
-          <a:xfrm>
-            <a:off x="0" y="0"/>
-            <a:ext cx="18288000" cy="10287000"/>
-          </a:xfrm>
-          <a:prstGeom prst="rect">
-            <a:avLst/>
-          </a:prstGeom>
-          <a:ln w="12700" cap="flat" cmpd="sng" algn="ctr">
-            <a:noFill/>
-            <a:prstDash val="solid"/>
-            <a:miter lim="800000"/>
-          </a:ln>
-          <a:effectLst/>
-          <a:extLst>
-            <a:ext uri="{91240B29-F687-4F45-9708-019B960494DF}">
-              <a14:hiddenLine xmlns:a14="http://schemas.microsoft.com/office/drawing/2010/main" w="12700" cap="flat" cmpd="sng" algn="ctr">
-                <a:solidFill>
-                  <a:schemeClr val="accent1">
-                    <a:shade val="50000"/>
-                  </a:schemeClr>
-                </a:solidFill>
-                <a:prstDash val="solid"/>
-                <a:miter lim="800000"/>
-              </a14:hiddenLine>
-            </a:ext>
-          </a:extLst>
-        </p:spPr>
-        <p:style>
-          <a:lnRef idx="2">
-            <a:schemeClr val="accent1">
-              <a:shade val="50000"/>
-            </a:schemeClr>
-          </a:lnRef>
-          <a:fillRef idx="1">
-            <a:schemeClr val="accent1"/>
-          </a:fillRef>
-          <a:effectRef idx="0">
-            <a:schemeClr val="accent1"/>
-          </a:effectRef>
-          <a:fontRef idx="minor">
-            <a:schemeClr val="lt1"/>
-          </a:fontRef>
-        </p:style>
-        <p:txBody>
-          <a:bodyPr rtlCol="0" anchor="ctr"/>
-          <a:lstStyle/>
-          <a:p>
-            <a:pPr algn="ctr"/>
-            <a:endParaRPr lang="en-US"/>
-          </a:p>
-        </p:txBody>
-      </p:sp>
-      <p:sp>
-        <p:nvSpPr>
-          <p:cNvPr id="11" name="Rectangle 10">
-            <a:extLst>
-              <a:ext uri="{FF2B5EF4-FFF2-40B4-BE49-F238E27FC236}">
-                <a16:creationId xmlns:a16="http://schemas.microsoft.com/office/drawing/2014/main" id="{E2384209-CB15-4CDF-9D31-C44FD9A3F20D}"/>
-              </a:ext>
-              <a:ext uri="{C183D7F6-B498-43B3-948B-1728B52AA6E4}">
-                <adec:decorative xmlns:adec="http://schemas.microsoft.com/office/drawing/2017/decorative" val="1"/>
-              </a:ext>
-            </a:extLst>
-          </p:cNvPr>
-          <p:cNvSpPr>
-            <a:spLocks noGrp="1" noRot="1" noChangeAspect="1" noMove="1" noResize="1" noEditPoints="1" noAdjustHandles="1" noChangeArrowheads="1" noChangeShapeType="1" noTextEdit="1"/>
-          </p:cNvSpPr>
-          <p:nvPr>
-            <p:extLst>
-              <p:ext uri="{386F3935-93C4-4BCD-93E2-E3B085C9AB24}">
-                <p16:designElem xmlns:p16="http://schemas.microsoft.com/office/powerpoint/2015/main" val="1"/>
-              </p:ext>
-            </p:extLst>
-          </p:nvPr>
-        </p:nvSpPr>
-        <p:spPr>
-          <a:xfrm rot="16200000" flipH="1">
-            <a:off x="3999926" y="-3999282"/>
-            <a:ext cx="10287000" cy="18286850"/>
-          </a:xfrm>
-          <a:prstGeom prst="rect">
-            <a:avLst/>
-          </a:prstGeom>
-          <a:gradFill>
-            <a:gsLst>
-              <a:gs pos="8000">
-                <a:schemeClr val="accent1"/>
-              </a:gs>
-              <a:gs pos="100000">
-                <a:schemeClr val="accent1">
-                  <a:lumMod val="50000"/>
-                </a:schemeClr>
-              </a:gs>
-            </a:gsLst>
-            <a:lin ang="12000000" scaled="0"/>
-          </a:gradFill>
-          <a:ln>
-            <a:noFill/>
-          </a:ln>
-        </p:spPr>
-        <p:style>
-          <a:lnRef idx="2">
-            <a:schemeClr val="accent1">
-              <a:shade val="50000"/>
-            </a:schemeClr>
-          </a:lnRef>
-          <a:fillRef idx="1">
-            <a:schemeClr val="accent1"/>
-          </a:fillRef>
-          <a:effectRef idx="0">
-            <a:schemeClr val="accent1"/>
-          </a:effectRef>
-          <a:fontRef idx="minor">
-            <a:schemeClr val="lt1"/>
-          </a:fontRef>
-        </p:style>
-        <p:txBody>
-          <a:bodyPr rtlCol="0" anchor="ctr"/>
-          <a:lstStyle/>
-          <a:p>
-            <a:pPr algn="ctr"/>
-            <a:endParaRPr lang="en-US"/>
-          </a:p>
-        </p:txBody>
-      </p:sp>
-      <p:sp>
-        <p:nvSpPr>
-          <p:cNvPr id="13" name="Rectangle 12">
-            <a:extLst>
-              <a:ext uri="{FF2B5EF4-FFF2-40B4-BE49-F238E27FC236}">
-                <a16:creationId xmlns:a16="http://schemas.microsoft.com/office/drawing/2014/main" id="{2633B3B5-CC90-43F0-8714-D31D1F3F0209}"/>
-              </a:ext>
-              <a:ext uri="{C183D7F6-B498-43B3-948B-1728B52AA6E4}">
-                <adec:decorative xmlns:adec="http://schemas.microsoft.com/office/drawing/2017/decorative" val="1"/>
-              </a:ext>
-            </a:extLst>
-          </p:cNvPr>
-          <p:cNvSpPr>
-            <a:spLocks noGrp="1" noRot="1" noChangeAspect="1" noMove="1" noResize="1" noEditPoints="1" noAdjustHandles="1" noChangeArrowheads="1" noChangeShapeType="1" noTextEdit="1"/>
-          </p:cNvSpPr>
-          <p:nvPr>
-            <p:extLst>
-              <p:ext uri="{386F3935-93C4-4BCD-93E2-E3B085C9AB24}">
-                <p16:designElem xmlns:p16="http://schemas.microsoft.com/office/powerpoint/2015/main" val="1"/>
-              </p:ext>
-            </p:extLst>
-          </p:nvPr>
-        </p:nvSpPr>
-        <p:spPr>
-          <a:xfrm rot="10800000" flipH="1">
-            <a:off x="-3466" y="0"/>
-            <a:ext cx="13606268" cy="10286358"/>
-          </a:xfrm>
-          <a:prstGeom prst="rect">
-            <a:avLst/>
-          </a:prstGeom>
-          <a:gradFill>
-            <a:gsLst>
-              <a:gs pos="8000">
-                <a:srgbClr val="000000">
-                  <a:alpha val="52000"/>
-                </a:srgbClr>
-              </a:gs>
-              <a:gs pos="100000">
-                <a:schemeClr val="accent1"/>
-              </a:gs>
-            </a:gsLst>
-            <a:lin ang="4800000" scaled="0"/>
-          </a:gradFill>
-          <a:ln>
-            <a:noFill/>
-          </a:ln>
-        </p:spPr>
-        <p:style>
-          <a:lnRef idx="2">
-            <a:schemeClr val="accent1">
-              <a:shade val="50000"/>
-            </a:schemeClr>
-          </a:lnRef>
-          <a:fillRef idx="1">
-            <a:schemeClr val="accent1"/>
-          </a:fillRef>
-          <a:effectRef idx="0">
-            <a:schemeClr val="accent1"/>
-          </a:effectRef>
-          <a:fontRef idx="minor">
-            <a:schemeClr val="lt1"/>
-          </a:fontRef>
-        </p:style>
-        <p:txBody>
-          <a:bodyPr rtlCol="0" anchor="ctr"/>
-          <a:lstStyle/>
-          <a:p>
-            <a:pPr algn="ctr"/>
-            <a:endParaRPr lang="en-US"/>
-          </a:p>
-        </p:txBody>
-      </p:sp>
-      <p:sp>
-        <p:nvSpPr>
-          <p:cNvPr id="15" name="Rectangle 14">
-            <a:extLst>
-              <a:ext uri="{FF2B5EF4-FFF2-40B4-BE49-F238E27FC236}">
-                <a16:creationId xmlns:a16="http://schemas.microsoft.com/office/drawing/2014/main" id="{A8D57A06-A426-446D-B02C-A2DC6B62E45E}"/>
-              </a:ext>
-              <a:ext uri="{C183D7F6-B498-43B3-948B-1728B52AA6E4}">
-                <adec:decorative xmlns:adec="http://schemas.microsoft.com/office/drawing/2017/decorative" val="1"/>
-              </a:ext>
-            </a:extLst>
-          </p:cNvPr>
-          <p:cNvSpPr>
-            <a:spLocks noGrp="1" noRot="1" noChangeAspect="1" noMove="1" noResize="1" noEditPoints="1" noAdjustHandles="1" noChangeArrowheads="1" noChangeShapeType="1" noTextEdit="1"/>
-          </p:cNvSpPr>
-          <p:nvPr>
-            <p:extLst>
-              <p:ext uri="{386F3935-93C4-4BCD-93E2-E3B085C9AB24}">
-                <p16:designElem xmlns:p16="http://schemas.microsoft.com/office/powerpoint/2015/main" val="1"/>
-              </p:ext>
-            </p:extLst>
-          </p:nvPr>
-        </p:nvSpPr>
-        <p:spPr>
-          <a:xfrm rot="16200000" flipH="1">
-            <a:off x="5474237" y="-2528760"/>
-            <a:ext cx="7341846" cy="18290319"/>
-          </a:xfrm>
-          <a:prstGeom prst="rect">
-            <a:avLst/>
-          </a:prstGeom>
-          <a:gradFill>
-            <a:gsLst>
-              <a:gs pos="0">
-                <a:schemeClr val="accent5">
-                  <a:lumMod val="60000"/>
-                  <a:lumOff val="40000"/>
-                  <a:alpha val="0"/>
-                </a:schemeClr>
-              </a:gs>
-              <a:gs pos="100000">
-                <a:srgbClr val="000000">
-                  <a:alpha val="46000"/>
-                </a:srgbClr>
-              </a:gs>
-            </a:gsLst>
-            <a:lin ang="1200000" scaled="0"/>
-          </a:gradFill>
-          <a:ln>
-            <a:noFill/>
-          </a:ln>
-        </p:spPr>
-        <p:style>
-          <a:lnRef idx="2">
-            <a:schemeClr val="accent1">
-              <a:shade val="50000"/>
-            </a:schemeClr>
-          </a:lnRef>
-          <a:fillRef idx="1">
-            <a:schemeClr val="accent1"/>
-          </a:fillRef>
-          <a:effectRef idx="0">
-            <a:schemeClr val="accent1"/>
-          </a:effectRef>
-          <a:fontRef idx="minor">
-            <a:schemeClr val="lt1"/>
-          </a:fontRef>
-        </p:style>
-        <p:txBody>
-          <a:bodyPr rtlCol="0" anchor="ctr"/>
-          <a:lstStyle/>
-          <a:p>
-            <a:pPr algn="ctr"/>
-            <a:endParaRPr lang="en-US"/>
-          </a:p>
-        </p:txBody>
-      </p:sp>
-      <p:grpSp>
-        <p:nvGrpSpPr>
-          <p:cNvPr id="2" name="Group 2"/>
-          <p:cNvGrpSpPr/>
-          <p:nvPr/>
-        </p:nvGrpSpPr>
-        <p:grpSpPr>
-          <a:xfrm>
-            <a:off x="685800" y="2305038"/>
-            <a:ext cx="16916400" cy="5676924"/>
-            <a:chOff x="4622592" y="-633356"/>
-            <a:chExt cx="15849599" cy="5318918"/>
-          </a:xfrm>
-        </p:grpSpPr>
-        <p:sp>
-          <p:nvSpPr>
-            <p:cNvPr id="3" name="TextBox 3"/>
-            <p:cNvSpPr txBox="1"/>
-            <p:nvPr/>
-          </p:nvSpPr>
-          <p:spPr>
-            <a:xfrm>
-              <a:off x="5943392" y="-633356"/>
-              <a:ext cx="14528799" cy="1145613"/>
-            </a:xfrm>
-            <a:prstGeom prst="rect">
-              <a:avLst/>
-            </a:prstGeom>
-          </p:spPr>
-          <p:txBody>
-            <a:bodyPr wrap="square" lIns="0" tIns="0" rIns="0" bIns="0" rtlCol="0" anchor="t">
-              <a:spAutoFit/>
-            </a:bodyPr>
-            <a:lstStyle/>
-            <a:p>
-              <a:pPr defTabSz="1298448">
-                <a:lnSpc>
-                  <a:spcPts val="9541"/>
-                </a:lnSpc>
-                <a:spcAft>
-                  <a:spcPts val="600"/>
-                </a:spcAft>
-              </a:pPr>
-              <a:r>
-                <a:rPr lang="en-US" sz="9087" kern="1200">
-                  <a:solidFill>
-                    <a:srgbClr val="F7B4A7"/>
-                  </a:solidFill>
-                  <a:latin typeface="Clear Sans Bold Bold"/>
-                  <a:ea typeface="+mn-ea"/>
-                  <a:cs typeface="+mn-cs"/>
-                </a:rPr>
-                <a:t>Project objectives</a:t>
-              </a:r>
-              <a:endParaRPr lang="en-US" sz="6399">
-                <a:solidFill>
-                  <a:srgbClr val="F7B4A7"/>
-                </a:solidFill>
-                <a:latin typeface="Clear Sans Bold Bold"/>
-              </a:endParaRPr>
-            </a:p>
-          </p:txBody>
-        </p:sp>
-        <p:sp>
-          <p:nvSpPr>
-            <p:cNvPr id="4" name="TextBox 4"/>
-            <p:cNvSpPr txBox="1"/>
-            <p:nvPr/>
-          </p:nvSpPr>
-          <p:spPr>
-            <a:xfrm>
-              <a:off x="4622592" y="992244"/>
-              <a:ext cx="12293599" cy="3693318"/>
-            </a:xfrm>
-            <a:prstGeom prst="rect">
-              <a:avLst/>
-            </a:prstGeom>
-          </p:spPr>
-          <p:txBody>
-            <a:bodyPr wrap="square" lIns="0" tIns="0" rIns="0" bIns="0" rtlCol="0" anchor="t">
-              <a:spAutoFit/>
-            </a:bodyPr>
-            <a:lstStyle/>
-            <a:p>
-              <a:pPr defTabSz="1298448">
-                <a:spcAft>
-                  <a:spcPts val="600"/>
-                </a:spcAft>
-              </a:pPr>
-              <a:endParaRPr lang="en-US" sz="5112" kern="1200">
-                <a:solidFill>
-                  <a:srgbClr val="94DDDE"/>
-                </a:solidFill>
-                <a:latin typeface="Clear Sans Regular"/>
-                <a:ea typeface="+mn-ea"/>
-                <a:cs typeface="+mn-cs"/>
-              </a:endParaRPr>
-            </a:p>
-            <a:p>
-              <a:pPr defTabSz="1298448">
-                <a:spcAft>
-                  <a:spcPts val="600"/>
-                </a:spcAft>
-              </a:pPr>
-              <a:r>
-                <a:rPr lang="en-US" sz="5112" kern="1200">
-                  <a:solidFill>
-                    <a:srgbClr val="94DDDE"/>
-                  </a:solidFill>
-                  <a:latin typeface="Clear Sans Regular"/>
-                  <a:ea typeface="+mn-ea"/>
-                  <a:cs typeface="+mn-cs"/>
-                </a:rPr>
-                <a:t>To develop an easy access website that enables costumer to visit and show them what to expect and experience on the place and foods offered.</a:t>
-              </a:r>
-              <a:endParaRPr lang="en-US" sz="3600">
-                <a:solidFill>
-                  <a:srgbClr val="94DDDE"/>
-                </a:solidFill>
-                <a:latin typeface="Clear Sans Regular"/>
-              </a:endParaRPr>
-            </a:p>
-          </p:txBody>
-        </p:sp>
-      </p:grpSp>
-    </p:spTree>
-  </p:cSld>
-  <p:clrMapOvr>
-    <a:masterClrMapping/>
-  </p:clrMapOvr>
-</p:sld>
-</file>
-
-<file path=ppt/slides/slide7.xml><?xml version="1.0" encoding="utf-8"?>
-<p:sld xmlns:a="http://schemas.openxmlformats.org/drawingml/2006/main" xmlns:r="http://schemas.openxmlformats.org/officeDocument/2006/relationships" xmlns:p="http://schemas.openxmlformats.org/presentationml/2006/main">
-  <p:cSld>
-    <p:bg>
-      <p:bgPr>
-        <a:solidFill>
-          <a:schemeClr val="bg1"/>
-        </a:solidFill>
-        <a:effectLst/>
-      </p:bgPr>
-    </p:bg>
-    <p:spTree>
-      <p:nvGrpSpPr>
-        <p:cNvPr id="1" name=""/>
-        <p:cNvGrpSpPr/>
-        <p:nvPr/>
-      </p:nvGrpSpPr>
-      <p:grpSpPr>
-        <a:xfrm>
-          <a:off x="0" y="0"/>
-          <a:ext cx="0" cy="0"/>
-          <a:chOff x="0" y="0"/>
-          <a:chExt cx="0" cy="0"/>
-        </a:xfrm>
-      </p:grpSpPr>
-      <p:sp useBgFill="1">
-        <p:nvSpPr>
-          <p:cNvPr id="11" name="Rectangle 10">
-            <a:extLst>
-              <a:ext uri="{FF2B5EF4-FFF2-40B4-BE49-F238E27FC236}">
-                <a16:creationId xmlns:a16="http://schemas.microsoft.com/office/drawing/2014/main" id="{AB8C311F-7253-4AED-9701-7FC0708C41C7}"/>
-              </a:ext>
-              <a:ext uri="{C183D7F6-B498-43B3-948B-1728B52AA6E4}">
-                <adec:decorative xmlns:adec="http://schemas.microsoft.com/office/drawing/2017/decorative" val="1"/>
-              </a:ext>
-            </a:extLst>
-          </p:cNvPr>
-          <p:cNvSpPr>
-            <a:spLocks noGrp="1" noRot="1" noChangeAspect="1" noMove="1" noResize="1" noEditPoints="1" noAdjustHandles="1" noChangeArrowheads="1" noChangeShapeType="1" noTextEdit="1"/>
-          </p:cNvSpPr>
-          <p:nvPr>
-            <p:extLst>
-              <p:ext uri="{386F3935-93C4-4BCD-93E2-E3B085C9AB24}">
-                <p16:designElem xmlns:p16="http://schemas.microsoft.com/office/powerpoint/2015/main" val="1"/>
-              </p:ext>
-            </p:extLst>
-          </p:nvPr>
-        </p:nvSpPr>
-        <p:spPr>
-          <a:xfrm>
-            <a:off x="0" y="0"/>
-            <a:ext cx="18288000" cy="10287000"/>
-          </a:xfrm>
-          <a:prstGeom prst="rect">
-            <a:avLst/>
-          </a:prstGeom>
-          <a:ln w="12700" cap="flat" cmpd="sng" algn="ctr">
-            <a:noFill/>
-            <a:prstDash val="solid"/>
-            <a:miter lim="800000"/>
-          </a:ln>
-          <a:effectLst/>
-          <a:extLst>
-            <a:ext uri="{91240B29-F687-4F45-9708-019B960494DF}">
-              <a14:hiddenLine xmlns:a14="http://schemas.microsoft.com/office/drawing/2010/main" w="12700" cap="flat" cmpd="sng" algn="ctr">
-                <a:solidFill>
-                  <a:schemeClr val="accent1">
-                    <a:shade val="50000"/>
-                  </a:schemeClr>
-                </a:solidFill>
-                <a:prstDash val="solid"/>
-                <a:miter lim="800000"/>
-              </a14:hiddenLine>
-            </a:ext>
-          </a:extLst>
-        </p:spPr>
-        <p:style>
-          <a:lnRef idx="2">
-            <a:schemeClr val="accent1">
-              <a:shade val="50000"/>
-            </a:schemeClr>
-          </a:lnRef>
-          <a:fillRef idx="1">
-            <a:schemeClr val="accent1"/>
-          </a:fillRef>
-          <a:effectRef idx="0">
-            <a:schemeClr val="accent1"/>
-          </a:effectRef>
-          <a:fontRef idx="minor">
-            <a:schemeClr val="lt1"/>
-          </a:fontRef>
-        </p:style>
-        <p:txBody>
-          <a:bodyPr rtlCol="0" anchor="ctr"/>
-          <a:lstStyle/>
-          <a:p>
-            <a:pPr algn="ctr"/>
-            <a:endParaRPr lang="en-US"/>
-          </a:p>
-        </p:txBody>
-      </p:sp>
-      <p:sp>
-        <p:nvSpPr>
-          <p:cNvPr id="13" name="Rectangle 12">
-            <a:extLst>
-              <a:ext uri="{FF2B5EF4-FFF2-40B4-BE49-F238E27FC236}">
-                <a16:creationId xmlns:a16="http://schemas.microsoft.com/office/drawing/2014/main" id="{E2384209-CB15-4CDF-9D31-C44FD9A3F20D}"/>
-              </a:ext>
-              <a:ext uri="{C183D7F6-B498-43B3-948B-1728B52AA6E4}">
-                <adec:decorative xmlns:adec="http://schemas.microsoft.com/office/drawing/2017/decorative" val="1"/>
-              </a:ext>
-            </a:extLst>
-          </p:cNvPr>
-          <p:cNvSpPr>
-            <a:spLocks noGrp="1" noRot="1" noChangeAspect="1" noMove="1" noResize="1" noEditPoints="1" noAdjustHandles="1" noChangeArrowheads="1" noChangeShapeType="1" noTextEdit="1"/>
-          </p:cNvSpPr>
-          <p:nvPr>
-            <p:extLst>
-              <p:ext uri="{386F3935-93C4-4BCD-93E2-E3B085C9AB24}">
-                <p16:designElem xmlns:p16="http://schemas.microsoft.com/office/powerpoint/2015/main" val="1"/>
-              </p:ext>
-            </p:extLst>
-          </p:nvPr>
-        </p:nvSpPr>
-        <p:spPr>
-          <a:xfrm rot="16200000" flipH="1">
-            <a:off x="3999926" y="-3999282"/>
-            <a:ext cx="10287000" cy="18286850"/>
-          </a:xfrm>
-          <a:prstGeom prst="rect">
-            <a:avLst/>
-          </a:prstGeom>
-          <a:gradFill>
-            <a:gsLst>
-              <a:gs pos="8000">
-                <a:schemeClr val="accent1"/>
-              </a:gs>
-              <a:gs pos="100000">
-                <a:schemeClr val="accent1">
-                  <a:lumMod val="50000"/>
-                </a:schemeClr>
-              </a:gs>
-            </a:gsLst>
-            <a:lin ang="12000000" scaled="0"/>
-          </a:gradFill>
-          <a:ln>
-            <a:noFill/>
-          </a:ln>
-        </p:spPr>
-        <p:style>
-          <a:lnRef idx="2">
-            <a:schemeClr val="accent1">
-              <a:shade val="50000"/>
-            </a:schemeClr>
-          </a:lnRef>
-          <a:fillRef idx="1">
-            <a:schemeClr val="accent1"/>
-          </a:fillRef>
-          <a:effectRef idx="0">
-            <a:schemeClr val="accent1"/>
-          </a:effectRef>
-          <a:fontRef idx="minor">
-            <a:schemeClr val="lt1"/>
-          </a:fontRef>
-        </p:style>
-        <p:txBody>
-          <a:bodyPr rtlCol="0" anchor="ctr"/>
-          <a:lstStyle/>
-          <a:p>
-            <a:pPr algn="ctr"/>
-            <a:endParaRPr lang="en-US"/>
-          </a:p>
-        </p:txBody>
-      </p:sp>
-      <p:sp>
-        <p:nvSpPr>
-          <p:cNvPr id="15" name="Rectangle 14">
-            <a:extLst>
-              <a:ext uri="{FF2B5EF4-FFF2-40B4-BE49-F238E27FC236}">
-                <a16:creationId xmlns:a16="http://schemas.microsoft.com/office/drawing/2014/main" id="{2633B3B5-CC90-43F0-8714-D31D1F3F0209}"/>
-              </a:ext>
-              <a:ext uri="{C183D7F6-B498-43B3-948B-1728B52AA6E4}">
-                <adec:decorative xmlns:adec="http://schemas.microsoft.com/office/drawing/2017/decorative" val="1"/>
-              </a:ext>
-            </a:extLst>
-          </p:cNvPr>
-          <p:cNvSpPr>
-            <a:spLocks noGrp="1" noRot="1" noChangeAspect="1" noMove="1" noResize="1" noEditPoints="1" noAdjustHandles="1" noChangeArrowheads="1" noChangeShapeType="1" noTextEdit="1"/>
-          </p:cNvSpPr>
-          <p:nvPr>
-            <p:extLst>
-              <p:ext uri="{386F3935-93C4-4BCD-93E2-E3B085C9AB24}">
-                <p16:designElem xmlns:p16="http://schemas.microsoft.com/office/powerpoint/2015/main" val="1"/>
-              </p:ext>
-            </p:extLst>
-          </p:nvPr>
-        </p:nvSpPr>
-        <p:spPr>
-          <a:xfrm rot="10800000" flipH="1">
-            <a:off x="-3466" y="0"/>
-            <a:ext cx="13606268" cy="10286358"/>
-          </a:xfrm>
-          <a:prstGeom prst="rect">
-            <a:avLst/>
-          </a:prstGeom>
-          <a:gradFill>
-            <a:gsLst>
-              <a:gs pos="8000">
-                <a:srgbClr val="000000">
-                  <a:alpha val="52000"/>
-                </a:srgbClr>
-              </a:gs>
-              <a:gs pos="100000">
-                <a:schemeClr val="accent1"/>
-              </a:gs>
-            </a:gsLst>
-            <a:lin ang="4800000" scaled="0"/>
-          </a:gradFill>
-          <a:ln>
-            <a:noFill/>
-          </a:ln>
-        </p:spPr>
-        <p:style>
-          <a:lnRef idx="2">
-            <a:schemeClr val="accent1">
-              <a:shade val="50000"/>
-            </a:schemeClr>
-          </a:lnRef>
-          <a:fillRef idx="1">
-            <a:schemeClr val="accent1"/>
-          </a:fillRef>
-          <a:effectRef idx="0">
-            <a:schemeClr val="accent1"/>
-          </a:effectRef>
-          <a:fontRef idx="minor">
-            <a:schemeClr val="lt1"/>
-          </a:fontRef>
-        </p:style>
-        <p:txBody>
-          <a:bodyPr rtlCol="0" anchor="ctr"/>
-          <a:lstStyle/>
-          <a:p>
-            <a:pPr algn="ctr"/>
-            <a:endParaRPr lang="en-US"/>
-          </a:p>
-        </p:txBody>
-      </p:sp>
-      <p:sp>
-        <p:nvSpPr>
-          <p:cNvPr id="17" name="Rectangle 16">
-            <a:extLst>
-              <a:ext uri="{FF2B5EF4-FFF2-40B4-BE49-F238E27FC236}">
-                <a16:creationId xmlns:a16="http://schemas.microsoft.com/office/drawing/2014/main" id="{A8D57A06-A426-446D-B02C-A2DC6B62E45E}"/>
-              </a:ext>
-              <a:ext uri="{C183D7F6-B498-43B3-948B-1728B52AA6E4}">
-                <adec:decorative xmlns:adec="http://schemas.microsoft.com/office/drawing/2017/decorative" val="1"/>
-              </a:ext>
-            </a:extLst>
-          </p:cNvPr>
-          <p:cNvSpPr>
-            <a:spLocks noGrp="1" noRot="1" noChangeAspect="1" noMove="1" noResize="1" noEditPoints="1" noAdjustHandles="1" noChangeArrowheads="1" noChangeShapeType="1" noTextEdit="1"/>
-          </p:cNvSpPr>
-          <p:nvPr>
-            <p:extLst>
-              <p:ext uri="{386F3935-93C4-4BCD-93E2-E3B085C9AB24}">
-                <p16:designElem xmlns:p16="http://schemas.microsoft.com/office/powerpoint/2015/main" val="1"/>
-              </p:ext>
-            </p:extLst>
-          </p:nvPr>
-        </p:nvSpPr>
-        <p:spPr>
-          <a:xfrm rot="16200000" flipH="1">
-            <a:off x="5474237" y="-2528760"/>
-            <a:ext cx="7341846" cy="18290319"/>
-          </a:xfrm>
-          <a:prstGeom prst="rect">
-            <a:avLst/>
-          </a:prstGeom>
-          <a:gradFill>
-            <a:gsLst>
-              <a:gs pos="0">
-                <a:schemeClr val="accent5">
-                  <a:lumMod val="60000"/>
-                  <a:lumOff val="40000"/>
-                  <a:alpha val="0"/>
-                </a:schemeClr>
-              </a:gs>
-              <a:gs pos="100000">
-                <a:srgbClr val="000000">
-                  <a:alpha val="46000"/>
-                </a:srgbClr>
-              </a:gs>
-            </a:gsLst>
-            <a:lin ang="1200000" scaled="0"/>
-          </a:gradFill>
-          <a:ln>
-            <a:noFill/>
-          </a:ln>
-        </p:spPr>
-        <p:style>
-          <a:lnRef idx="2">
-            <a:schemeClr val="accent1">
-              <a:shade val="50000"/>
-            </a:schemeClr>
-          </a:lnRef>
-          <a:fillRef idx="1">
-            <a:schemeClr val="accent1"/>
-          </a:fillRef>
-          <a:effectRef idx="0">
-            <a:schemeClr val="accent1"/>
-          </a:effectRef>
-          <a:fontRef idx="minor">
-            <a:schemeClr val="lt1"/>
-          </a:fontRef>
-        </p:style>
-        <p:txBody>
-          <a:bodyPr rtlCol="0" anchor="ctr"/>
-          <a:lstStyle/>
-          <a:p>
-            <a:pPr algn="ctr"/>
-            <a:endParaRPr lang="en-US"/>
-          </a:p>
-        </p:txBody>
-      </p:sp>
-      <p:pic>
-        <p:nvPicPr>
-          <p:cNvPr id="2" name="Picture 2"/>
-          <p:cNvPicPr>
-            <a:picLocks noChangeAspect="1"/>
-          </p:cNvPicPr>
-          <p:nvPr/>
-        </p:nvPicPr>
-        <p:blipFill>
-          <a:blip r:embed="rId2">
-            <a:extLst>
-              <a:ext uri="{28A0092B-C50C-407E-A947-70E740481C1C}">
-                <a14:useLocalDpi xmlns:a14="http://schemas.microsoft.com/office/drawing/2010/main" val="0"/>
-              </a:ext>
-              <a:ext uri="{96DAC541-7B7A-43D3-8B79-37D633B846F1}">
-                <asvg:svgBlip xmlns:asvg="http://schemas.microsoft.com/office/drawing/2016/SVG/main" r:embed="rId3"/>
-              </a:ext>
-            </a:extLst>
-          </a:blip>
-          <a:srcRect/>
-          <a:stretch>
-            <a:fillRect/>
-          </a:stretch>
-        </p:blipFill>
-        <p:spPr>
-          <a:xfrm>
-            <a:off x="10409325" y="1520715"/>
-            <a:ext cx="7192875" cy="7245570"/>
-          </a:xfrm>
-          <a:prstGeom prst="rect">
-            <a:avLst/>
-          </a:prstGeom>
-        </p:spPr>
-      </p:pic>
-      <p:sp>
-        <p:nvSpPr>
-          <p:cNvPr id="3" name="TextBox 3"/>
-          <p:cNvSpPr txBox="1"/>
-          <p:nvPr/>
-        </p:nvSpPr>
-        <p:spPr>
-          <a:xfrm>
-            <a:off x="685800" y="3057256"/>
-            <a:ext cx="8248297" cy="2794269"/>
-          </a:xfrm>
-          <a:prstGeom prst="rect">
-            <a:avLst/>
-          </a:prstGeom>
-        </p:spPr>
-        <p:txBody>
-          <a:bodyPr lIns="0" tIns="0" rIns="0" bIns="0" rtlCol="0" anchor="t">
-            <a:spAutoFit/>
-          </a:bodyPr>
-          <a:lstStyle/>
-          <a:p>
-            <a:pPr defTabSz="1033272">
-              <a:lnSpc>
-                <a:spcPts val="10848"/>
-              </a:lnSpc>
-              <a:spcAft>
-                <a:spcPts val="600"/>
-              </a:spcAft>
-            </a:pPr>
-            <a:r>
-              <a:rPr lang="en-US" sz="9040" kern="1200">
-                <a:solidFill>
-                  <a:srgbClr val="F7B4A7"/>
-                </a:solidFill>
-                <a:latin typeface="Clear Sans Bold Bold"/>
-                <a:ea typeface="+mn-ea"/>
-                <a:cs typeface="+mn-cs"/>
-              </a:rPr>
-              <a:t>Target Audience:</a:t>
-            </a:r>
-            <a:endParaRPr lang="en-US" sz="8000">
-              <a:solidFill>
-                <a:srgbClr val="F7B4A7"/>
-              </a:solidFill>
-              <a:latin typeface="Clear Sans Bold Bold"/>
-            </a:endParaRPr>
-          </a:p>
-        </p:txBody>
-      </p:sp>
-      <p:sp>
-        <p:nvSpPr>
-          <p:cNvPr id="4" name="TextBox 4">
-            <a:extLst>
-              <a:ext uri="{FF2B5EF4-FFF2-40B4-BE49-F238E27FC236}">
-                <a16:creationId xmlns:a16="http://schemas.microsoft.com/office/drawing/2014/main" id="{FEF17D7A-09E4-3DC2-F13D-00475A96C9AB}"/>
-              </a:ext>
-            </a:extLst>
-          </p:cNvPr>
-          <p:cNvSpPr txBox="1"/>
-          <p:nvPr/>
-        </p:nvSpPr>
-        <p:spPr>
-          <a:xfrm>
-            <a:off x="708359" y="6959504"/>
-            <a:ext cx="7242511" cy="548765"/>
-          </a:xfrm>
-          <a:prstGeom prst="rect">
-            <a:avLst/>
-          </a:prstGeom>
-        </p:spPr>
-        <p:txBody>
-          <a:bodyPr lIns="0" tIns="0" rIns="0" bIns="0" rtlCol="0" anchor="t">
-            <a:spAutoFit/>
-          </a:bodyPr>
-          <a:lstStyle/>
-          <a:p>
-            <a:pPr defTabSz="1033272">
-              <a:lnSpc>
-                <a:spcPts val="4588"/>
-              </a:lnSpc>
-              <a:spcAft>
-                <a:spcPts val="600"/>
-              </a:spcAft>
-            </a:pPr>
-            <a:r>
-              <a:rPr lang="en-US" sz="3277" kern="1200">
-                <a:solidFill>
-                  <a:srgbClr val="94DDDE"/>
-                </a:solidFill>
-                <a:latin typeface="Clear Sans Regular"/>
-                <a:ea typeface="+mn-ea"/>
-                <a:cs typeface="+mn-cs"/>
-              </a:rPr>
-              <a:t>All gender</a:t>
-            </a:r>
-            <a:endParaRPr lang="en-US" sz="2900">
-              <a:solidFill>
-                <a:srgbClr val="94DDDE"/>
-              </a:solidFill>
-              <a:latin typeface="Clear Sans Regular"/>
-            </a:endParaRPr>
-          </a:p>
-        </p:txBody>
-      </p:sp>
-      <p:sp>
-        <p:nvSpPr>
-          <p:cNvPr id="5" name="TextBox 4">
-            <a:extLst>
-              <a:ext uri="{FF2B5EF4-FFF2-40B4-BE49-F238E27FC236}">
-                <a16:creationId xmlns:a16="http://schemas.microsoft.com/office/drawing/2014/main" id="{3A29F2CD-BD7B-77B1-9E40-A298C90AC65B}"/>
-              </a:ext>
-            </a:extLst>
-          </p:cNvPr>
-          <p:cNvSpPr txBox="1"/>
-          <p:nvPr/>
-        </p:nvSpPr>
-        <p:spPr>
-          <a:xfrm>
-            <a:off x="712119" y="7737791"/>
-            <a:ext cx="7242511" cy="548765"/>
-          </a:xfrm>
-          <a:prstGeom prst="rect">
-            <a:avLst/>
-          </a:prstGeom>
-        </p:spPr>
-        <p:txBody>
-          <a:bodyPr lIns="0" tIns="0" rIns="0" bIns="0" rtlCol="0" anchor="t">
-            <a:spAutoFit/>
-          </a:bodyPr>
-          <a:lstStyle/>
-          <a:p>
-            <a:pPr defTabSz="1033272">
-              <a:lnSpc>
-                <a:spcPts val="4588"/>
-              </a:lnSpc>
-              <a:spcAft>
-                <a:spcPts val="600"/>
-              </a:spcAft>
-            </a:pPr>
-            <a:r>
-              <a:rPr lang="en-US" sz="3277" kern="1200">
-                <a:solidFill>
-                  <a:srgbClr val="94DDDE"/>
-                </a:solidFill>
-                <a:latin typeface="Clear Sans Regular"/>
-                <a:ea typeface="+mn-ea"/>
-                <a:cs typeface="+mn-cs"/>
-              </a:rPr>
-              <a:t>Resident in Leyte</a:t>
-            </a:r>
-            <a:endParaRPr lang="en-US" sz="2900">
-              <a:solidFill>
-                <a:srgbClr val="94DDDE"/>
-              </a:solidFill>
-              <a:latin typeface="Clear Sans Regular"/>
-            </a:endParaRPr>
-          </a:p>
-        </p:txBody>
-      </p:sp>
     </p:spTree>
   </p:cSld>
   <p:clrMapOvr>

</xml_diff>